<commit_message>
adding slides with no answers
</commit_message>
<xml_diff>
--- a/02-requirementsSpecification.pptx
+++ b/02-requirementsSpecification.pptx
@@ -5,7 +5,7 @@
     <p:sldMasterId id="2147483912" r:id="rId4"/>
   </p:sldMasterIdLst>
   <p:notesMasterIdLst>
-    <p:notesMasterId r:id="rId35"/>
+    <p:notesMasterId r:id="rId26"/>
   </p:notesMasterIdLst>
   <p:sldIdLst>
     <p:sldId id="256" r:id="rId5"/>
@@ -15,29 +15,20 @@
     <p:sldId id="289" r:id="rId9"/>
     <p:sldId id="294" r:id="rId10"/>
     <p:sldId id="282" r:id="rId11"/>
-    <p:sldId id="305" r:id="rId12"/>
-    <p:sldId id="284" r:id="rId13"/>
-    <p:sldId id="283" r:id="rId14"/>
-    <p:sldId id="299" r:id="rId15"/>
-    <p:sldId id="286" r:id="rId16"/>
-    <p:sldId id="300" r:id="rId17"/>
-    <p:sldId id="301" r:id="rId18"/>
-    <p:sldId id="285" r:id="rId19"/>
-    <p:sldId id="287" r:id="rId20"/>
-    <p:sldId id="302" r:id="rId21"/>
-    <p:sldId id="288" r:id="rId22"/>
-    <p:sldId id="303" r:id="rId23"/>
-    <p:sldId id="290" r:id="rId24"/>
-    <p:sldId id="304" r:id="rId25"/>
-    <p:sldId id="295" r:id="rId26"/>
-    <p:sldId id="291" r:id="rId27"/>
-    <p:sldId id="297" r:id="rId28"/>
-    <p:sldId id="306" r:id="rId29"/>
-    <p:sldId id="298" r:id="rId30"/>
-    <p:sldId id="307" r:id="rId31"/>
-    <p:sldId id="296" r:id="rId32"/>
-    <p:sldId id="278" r:id="rId33"/>
-    <p:sldId id="279" r:id="rId34"/>
+    <p:sldId id="284" r:id="rId12"/>
+    <p:sldId id="283" r:id="rId13"/>
+    <p:sldId id="286" r:id="rId14"/>
+    <p:sldId id="301" r:id="rId15"/>
+    <p:sldId id="287" r:id="rId16"/>
+    <p:sldId id="288" r:id="rId17"/>
+    <p:sldId id="290" r:id="rId18"/>
+    <p:sldId id="295" r:id="rId19"/>
+    <p:sldId id="291" r:id="rId20"/>
+    <p:sldId id="297" r:id="rId21"/>
+    <p:sldId id="298" r:id="rId22"/>
+    <p:sldId id="296" r:id="rId23"/>
+    <p:sldId id="278" r:id="rId24"/>
+    <p:sldId id="279" r:id="rId25"/>
   </p:sldIdLst>
   <p:sldSz cx="12192000" cy="6858000"/>
   <p:notesSz cx="6858000" cy="9144000"/>
@@ -148,26 +139,17 @@
             <p14:sldId id="289"/>
             <p14:sldId id="294"/>
             <p14:sldId id="282"/>
-            <p14:sldId id="305"/>
             <p14:sldId id="284"/>
             <p14:sldId id="283"/>
-            <p14:sldId id="299"/>
             <p14:sldId id="286"/>
-            <p14:sldId id="300"/>
             <p14:sldId id="301"/>
-            <p14:sldId id="285"/>
             <p14:sldId id="287"/>
-            <p14:sldId id="302"/>
             <p14:sldId id="288"/>
-            <p14:sldId id="303"/>
             <p14:sldId id="290"/>
-            <p14:sldId id="304"/>
             <p14:sldId id="295"/>
             <p14:sldId id="291"/>
             <p14:sldId id="297"/>
-            <p14:sldId id="306"/>
             <p14:sldId id="298"/>
-            <p14:sldId id="307"/>
             <p14:sldId id="296"/>
             <p14:sldId id="278"/>
             <p14:sldId id="279"/>
@@ -1006,237 +988,6 @@
     <p:extLst>
       <p:ext uri="{BB962C8B-B14F-4D97-AF65-F5344CB8AC3E}">
         <p14:creationId xmlns:p14="http://schemas.microsoft.com/office/powerpoint/2010/main" val="1829364677"/>
-      </p:ext>
-    </p:extLst>
-  </p:cSld>
-  <p:clrMapOvr>
-    <a:masterClrMapping/>
-  </p:clrMapOvr>
-</p:notes>
-</file>
-
-<file path=ppt/notesSlides/notesSlide5.xml><?xml version="1.0" encoding="utf-8"?>
-<p:notes xmlns:a="http://schemas.openxmlformats.org/drawingml/2006/main" xmlns:r="http://schemas.openxmlformats.org/officeDocument/2006/relationships" xmlns:p="http://schemas.openxmlformats.org/presentationml/2006/main">
-  <p:cSld>
-    <p:spTree>
-      <p:nvGrpSpPr>
-        <p:cNvPr id="1" name=""/>
-        <p:cNvGrpSpPr/>
-        <p:nvPr/>
-      </p:nvGrpSpPr>
-      <p:grpSpPr>
-        <a:xfrm>
-          <a:off x="0" y="0"/>
-          <a:ext cx="0" cy="0"/>
-          <a:chOff x="0" y="0"/>
-          <a:chExt cx="0" cy="0"/>
-        </a:xfrm>
-      </p:grpSpPr>
-      <p:sp>
-        <p:nvSpPr>
-          <p:cNvPr id="2" name="Slide Image Placeholder 1"/>
-          <p:cNvSpPr>
-            <a:spLocks noGrp="1" noRot="1" noChangeAspect="1"/>
-          </p:cNvSpPr>
-          <p:nvPr>
-            <p:ph type="sldImg"/>
-          </p:nvPr>
-        </p:nvSpPr>
-        <p:spPr/>
-      </p:sp>
-      <p:sp>
-        <p:nvSpPr>
-          <p:cNvPr id="3" name="Notes Placeholder 2"/>
-          <p:cNvSpPr>
-            <a:spLocks noGrp="1"/>
-          </p:cNvSpPr>
-          <p:nvPr>
-            <p:ph type="body" idx="1"/>
-          </p:nvPr>
-        </p:nvSpPr>
-        <p:spPr/>
-        <p:txBody>
-          <a:bodyPr/>
-          <a:lstStyle/>
-          <a:p>
-            <a:r>
-              <a:rPr lang="en-CA" dirty="0" smtClean="0"/>
-              <a:t>Consistent numbering system: traceable</a:t>
-            </a:r>
-            <a:r>
-              <a:rPr lang="en-CA" baseline="0" dirty="0" smtClean="0"/>
-              <a:t> </a:t>
-            </a:r>
-            <a:endParaRPr lang="en-CA" dirty="0" smtClean="0"/>
-          </a:p>
-          <a:p>
-            <a:r>
-              <a:rPr lang="en-CA" dirty="0" smtClean="0"/>
-              <a:t>Title</a:t>
-            </a:r>
-            <a:r>
-              <a:rPr lang="en-CA" baseline="0" dirty="0" smtClean="0"/>
-              <a:t>s for each requirement</a:t>
-            </a:r>
-          </a:p>
-          <a:p>
-            <a:r>
-              <a:rPr lang="en-CA" baseline="0" dirty="0" smtClean="0"/>
-              <a:t>Use unambiguous wording for input fields. (make it clear that there are 2 input fields 1 for </a:t>
-            </a:r>
-            <a:r>
-              <a:rPr lang="en-CA" baseline="0" dirty="0" err="1" smtClean="0"/>
-              <a:t>uname</a:t>
-            </a:r>
-            <a:r>
-              <a:rPr lang="en-CA" baseline="0" dirty="0" smtClean="0"/>
-              <a:t> 1 for pw)</a:t>
-            </a:r>
-          </a:p>
-          <a:p>
-            <a:r>
-              <a:rPr lang="en-CA" dirty="0" smtClean="0"/>
-              <a:t>Relevance.</a:t>
-            </a:r>
-            <a:r>
-              <a:rPr lang="en-CA" baseline="0" dirty="0" smtClean="0"/>
-              <a:t> How is hacking into the app a customer issue</a:t>
-            </a:r>
-            <a:endParaRPr lang="en-CA" dirty="0"/>
-          </a:p>
-        </p:txBody>
-      </p:sp>
-      <p:sp>
-        <p:nvSpPr>
-          <p:cNvPr id="4" name="Slide Number Placeholder 3"/>
-          <p:cNvSpPr>
-            <a:spLocks noGrp="1"/>
-          </p:cNvSpPr>
-          <p:nvPr>
-            <p:ph type="sldNum" sz="quarter" idx="10"/>
-          </p:nvPr>
-        </p:nvSpPr>
-        <p:spPr/>
-        <p:txBody>
-          <a:bodyPr/>
-          <a:lstStyle/>
-          <a:p>
-            <a:fld id="{A7666ED7-631A-46AF-B451-227D0A8685A0}" type="slidenum">
-              <a:rPr lang="en-US" smtClean="0"/>
-              <a:t>25</a:t>
-            </a:fld>
-            <a:endParaRPr lang="en-US"/>
-          </a:p>
-        </p:txBody>
-      </p:sp>
-    </p:spTree>
-    <p:extLst>
-      <p:ext uri="{BB962C8B-B14F-4D97-AF65-F5344CB8AC3E}">
-        <p14:creationId xmlns:p14="http://schemas.microsoft.com/office/powerpoint/2010/main" val="2095477626"/>
-      </p:ext>
-    </p:extLst>
-  </p:cSld>
-  <p:clrMapOvr>
-    <a:masterClrMapping/>
-  </p:clrMapOvr>
-</p:notes>
-</file>
-
-<file path=ppt/notesSlides/notesSlide6.xml><?xml version="1.0" encoding="utf-8"?>
-<p:notes xmlns:a="http://schemas.openxmlformats.org/drawingml/2006/main" xmlns:r="http://schemas.openxmlformats.org/officeDocument/2006/relationships" xmlns:p="http://schemas.openxmlformats.org/presentationml/2006/main">
-  <p:cSld>
-    <p:spTree>
-      <p:nvGrpSpPr>
-        <p:cNvPr id="1" name=""/>
-        <p:cNvGrpSpPr/>
-        <p:nvPr/>
-      </p:nvGrpSpPr>
-      <p:grpSpPr>
-        <a:xfrm>
-          <a:off x="0" y="0"/>
-          <a:ext cx="0" cy="0"/>
-          <a:chOff x="0" y="0"/>
-          <a:chExt cx="0" cy="0"/>
-        </a:xfrm>
-      </p:grpSpPr>
-      <p:sp>
-        <p:nvSpPr>
-          <p:cNvPr id="2" name="Slide Image Placeholder 1"/>
-          <p:cNvSpPr>
-            <a:spLocks noGrp="1" noRot="1" noChangeAspect="1"/>
-          </p:cNvSpPr>
-          <p:nvPr>
-            <p:ph type="sldImg"/>
-          </p:nvPr>
-        </p:nvSpPr>
-        <p:spPr/>
-      </p:sp>
-      <p:sp>
-        <p:nvSpPr>
-          <p:cNvPr id="3" name="Notes Placeholder 2"/>
-          <p:cNvSpPr>
-            <a:spLocks noGrp="1"/>
-          </p:cNvSpPr>
-          <p:nvPr>
-            <p:ph type="body" idx="1"/>
-          </p:nvPr>
-        </p:nvSpPr>
-        <p:spPr/>
-        <p:txBody>
-          <a:bodyPr/>
-          <a:lstStyle/>
-          <a:p>
-            <a:r>
-              <a:rPr lang="en-CA" dirty="0" smtClean="0"/>
-              <a:t>What</a:t>
-            </a:r>
-            <a:r>
-              <a:rPr lang="en-CA" baseline="0" dirty="0" smtClean="0"/>
-              <a:t> value is there in jpg &lt; 100kb</a:t>
-            </a:r>
-          </a:p>
-          <a:p>
-            <a:r>
-              <a:rPr lang="en-CA" baseline="0" dirty="0" smtClean="0"/>
-              <a:t>Nano seconds are not feasible by today’s standards</a:t>
-            </a:r>
-          </a:p>
-          <a:p>
-            <a:r>
-              <a:rPr lang="en-CA" baseline="0" dirty="0" smtClean="0"/>
-              <a:t>Google analytics is too much of an implementation detail</a:t>
-            </a:r>
-            <a:endParaRPr lang="en-CA" dirty="0"/>
-          </a:p>
-        </p:txBody>
-      </p:sp>
-      <p:sp>
-        <p:nvSpPr>
-          <p:cNvPr id="4" name="Slide Number Placeholder 3"/>
-          <p:cNvSpPr>
-            <a:spLocks noGrp="1"/>
-          </p:cNvSpPr>
-          <p:nvPr>
-            <p:ph type="sldNum" sz="quarter" idx="10"/>
-          </p:nvPr>
-        </p:nvSpPr>
-        <p:spPr/>
-        <p:txBody>
-          <a:bodyPr/>
-          <a:lstStyle/>
-          <a:p>
-            <a:fld id="{A7666ED7-631A-46AF-B451-227D0A8685A0}" type="slidenum">
-              <a:rPr lang="en-US" smtClean="0"/>
-              <a:t>27</a:t>
-            </a:fld>
-            <a:endParaRPr lang="en-US"/>
-          </a:p>
-        </p:txBody>
-      </p:sp>
-    </p:spTree>
-    <p:extLst>
-      <p:ext uri="{BB962C8B-B14F-4D97-AF65-F5344CB8AC3E}">
-        <p14:creationId xmlns:p14="http://schemas.microsoft.com/office/powerpoint/2010/main" val="426592581"/>
       </p:ext>
     </p:extLst>
   </p:cSld>
@@ -4734,11 +4485,11 @@
   <p:clrMapOvr>
     <a:masterClrMapping/>
   </p:clrMapOvr>
-  <mc:AlternateContent xmlns:mc="http://schemas.openxmlformats.org/markup-compatibility/2006">
-    <mc:Choice xmlns:p14="http://schemas.microsoft.com/office/powerpoint/2010/main" Requires="p14">
+  <mc:AlternateContent xmlns:mc="http://schemas.openxmlformats.org/markup-compatibility/2006" xmlns:p14="http://schemas.microsoft.com/office/powerpoint/2010/main">
+    <mc:Choice Requires="p14">
       <p:transition p14:dur="0"/>
     </mc:Choice>
-    <mc:Fallback>
+    <mc:Fallback xmlns="">
       <p:transition/>
     </mc:Fallback>
   </mc:AlternateContent>
@@ -4786,7 +4537,7 @@
           <a:p>
             <a:r>
               <a:rPr lang="en-CA" dirty="0" smtClean="0"/>
-              <a:t>Performance Requirements</a:t>
+              <a:t>Usability Requirements</a:t>
             </a:r>
             <a:endParaRPr lang="en-CA" dirty="0"/>
           </a:p>
@@ -4809,7 +4560,17 @@
           <a:p>
             <a:r>
               <a:rPr lang="en-CA" dirty="0"/>
-              <a:t>Execution speed, response time, or throughput?</a:t>
+              <a:t>What kind of training is required?</a:t>
+            </a:r>
+          </a:p>
+          <a:p>
+            <a:r>
+              <a:rPr lang="en-CA" dirty="0" smtClean="0"/>
+              <a:t>Ease </a:t>
+            </a:r>
+            <a:r>
+              <a:rPr lang="en-CA" dirty="0"/>
+              <a:t>of understanding the system or user interface?</a:t>
             </a:r>
           </a:p>
           <a:p>
@@ -4819,43 +4580,35 @@
             </a:r>
             <a:r>
               <a:rPr lang="en-CA" dirty="0"/>
-              <a:t>much data will flow through the system?</a:t>
-            </a:r>
-          </a:p>
-          <a:p>
-            <a:r>
-              <a:rPr lang="en-CA" dirty="0" smtClean="0"/>
-              <a:t>How </a:t>
-            </a:r>
-            <a:r>
-              <a:rPr lang="en-CA" dirty="0"/>
-              <a:t>often is data sent or received?</a:t>
-            </a:r>
-            <a:endParaRPr lang="en-CA" dirty="0" smtClean="0"/>
-          </a:p>
-          <a:p>
-            <a:r>
-              <a:rPr lang="en-CA" dirty="0" smtClean="0"/>
-              <a:t>What are the limits of the system?</a:t>
-            </a:r>
+              <a:t>difficult should it be to misuse the system?</a:t>
+            </a:r>
+          </a:p>
+          <a:p>
+            <a:pPr marL="0" indent="0">
+              <a:buNone/>
+            </a:pPr>
+            <a:endParaRPr lang="en-CA" dirty="0"/>
+          </a:p>
+          <a:p>
+            <a:endParaRPr lang="en-CA" dirty="0"/>
           </a:p>
         </p:txBody>
       </p:sp>
     </p:spTree>
     <p:extLst>
       <p:ext uri="{BB962C8B-B14F-4D97-AF65-F5344CB8AC3E}">
-        <p14:creationId xmlns:p14="http://schemas.microsoft.com/office/powerpoint/2010/main" val="141419607"/>
+        <p14:creationId xmlns:p14="http://schemas.microsoft.com/office/powerpoint/2010/main" val="455335593"/>
       </p:ext>
     </p:extLst>
   </p:cSld>
   <p:clrMapOvr>
     <a:masterClrMapping/>
   </p:clrMapOvr>
-  <mc:AlternateContent xmlns:mc="http://schemas.openxmlformats.org/markup-compatibility/2006">
-    <mc:Choice xmlns:p14="http://schemas.microsoft.com/office/powerpoint/2010/main" Requires="p14">
+  <mc:AlternateContent xmlns:mc="http://schemas.openxmlformats.org/markup-compatibility/2006" xmlns:p14="http://schemas.microsoft.com/office/powerpoint/2010/main">
+    <mc:Choice Requires="p14">
       <p:transition p14:dur="0"/>
     </mc:Choice>
-    <mc:Fallback>
+    <mc:Fallback xmlns="">
       <p:transition/>
     </mc:Fallback>
   </mc:AlternateContent>
@@ -4903,7 +4656,7 @@
           <a:p>
             <a:r>
               <a:rPr lang="en-CA" dirty="0" smtClean="0"/>
-              <a:t>Performance Requirements</a:t>
+              <a:t>Security Requirement</a:t>
             </a:r>
             <a:endParaRPr lang="en-CA" dirty="0"/>
           </a:p>
@@ -4921,93 +4674,66 @@
         </p:nvSpPr>
         <p:spPr/>
         <p:txBody>
-          <a:bodyPr/>
+          <a:bodyPr>
+            <a:normAutofit/>
+          </a:bodyPr>
           <a:lstStyle/>
           <a:p>
             <a:r>
               <a:rPr lang="en-CA" dirty="0"/>
-              <a:t>Execution speed, response time, or throughput?</a:t>
-            </a:r>
-          </a:p>
-          <a:p>
-            <a:r>
-              <a:rPr lang="en-CA" dirty="0" smtClean="0"/>
-              <a:t>How </a:t>
+              <a:t>Is access to the system controlled? To all features?</a:t>
+            </a:r>
+          </a:p>
+          <a:p>
+            <a:r>
+              <a:rPr lang="en-CA" dirty="0" smtClean="0"/>
+              <a:t>Different </a:t>
             </a:r>
             <a:r>
               <a:rPr lang="en-CA" dirty="0"/>
-              <a:t>much data will flow through the system?</a:t>
-            </a:r>
-          </a:p>
-          <a:p>
-            <a:r>
-              <a:rPr lang="en-CA" dirty="0" smtClean="0"/>
-              <a:t>How </a:t>
+              <a:t>levels of user access?</a:t>
+            </a:r>
+          </a:p>
+          <a:p>
+            <a:r>
+              <a:rPr lang="en-CA" dirty="0" smtClean="0"/>
+              <a:t>Should </a:t>
             </a:r>
             <a:r>
               <a:rPr lang="en-CA" dirty="0"/>
-              <a:t>often is data sent or received?</a:t>
-            </a:r>
+              <a:t>portions of the system be isolated from others?</a:t>
+            </a:r>
+          </a:p>
+          <a:p>
+            <a:r>
+              <a:rPr lang="en-CA" dirty="0" smtClean="0"/>
+              <a:t>Precautions </a:t>
+            </a:r>
+            <a:r>
+              <a:rPr lang="en-CA" dirty="0"/>
+              <a:t>against theft?</a:t>
+            </a:r>
+          </a:p>
+          <a:p>
             <a:endParaRPr lang="en-CA" dirty="0" smtClean="0"/>
-          </a:p>
-          <a:p>
-            <a:r>
-              <a:rPr lang="en-CA" dirty="0" smtClean="0"/>
-              <a:t>What are the limits of the system?</a:t>
-            </a:r>
-          </a:p>
-          <a:p>
-            <a:r>
-              <a:rPr lang="en-CA" u="sng" dirty="0" smtClean="0"/>
-              <a:t>Examples</a:t>
-            </a:r>
-          </a:p>
-          <a:p>
-            <a:r>
-              <a:rPr lang="en-CA" dirty="0" smtClean="0"/>
-              <a:t>For a connected device, a new message </a:t>
-            </a:r>
-            <a:r>
-              <a:rPr lang="en-CA" b="1" dirty="0" smtClean="0"/>
-              <a:t>should</a:t>
-            </a:r>
-            <a:r>
-              <a:rPr lang="en-CA" dirty="0" smtClean="0"/>
-              <a:t> arrive under 5 seconds</a:t>
-            </a:r>
-          </a:p>
-          <a:p>
-            <a:r>
-              <a:rPr lang="en-CA" dirty="0" smtClean="0"/>
-              <a:t>Group conversations shall include a </a:t>
-            </a:r>
-            <a:r>
-              <a:rPr lang="en-CA" b="1" dirty="0" smtClean="0"/>
-              <a:t>maximum</a:t>
-            </a:r>
-            <a:r>
-              <a:rPr lang="en-CA" dirty="0" smtClean="0"/>
-              <a:t> of 100 participants</a:t>
-            </a:r>
-            <a:endParaRPr lang="en-CA" dirty="0"/>
           </a:p>
         </p:txBody>
       </p:sp>
     </p:spTree>
     <p:extLst>
       <p:ext uri="{BB962C8B-B14F-4D97-AF65-F5344CB8AC3E}">
-        <p14:creationId xmlns:p14="http://schemas.microsoft.com/office/powerpoint/2010/main" val="2941383942"/>
+        <p14:creationId xmlns:p14="http://schemas.microsoft.com/office/powerpoint/2010/main" val="3856216483"/>
       </p:ext>
     </p:extLst>
   </p:cSld>
   <p:clrMapOvr>
     <a:masterClrMapping/>
   </p:clrMapOvr>
-  <mc:AlternateContent xmlns:mc="http://schemas.openxmlformats.org/markup-compatibility/2006">
-    <mc:Choice xmlns:p14="http://schemas.microsoft.com/office/powerpoint/2010/main" Requires="p14">
+  <mc:AlternateContent xmlns:mc="http://schemas.openxmlformats.org/markup-compatibility/2006" xmlns:p14="http://schemas.microsoft.com/office/powerpoint/2010/main">
+    <mc:Choice Requires="p14">
       <p:transition p14:dur="0"/>
     </mc:Choice>
-    <mc:Fallback>
+    <mc:Fallback xmlns="">
       <p:transition/>
     </mc:Fallback>
   </mc:AlternateContent>
@@ -5055,7 +4781,7 @@
           <a:p>
             <a:r>
               <a:rPr lang="en-CA" dirty="0" smtClean="0"/>
-              <a:t>Usability Requirements</a:t>
+              <a:t>Reliability and Availability Requirements</a:t>
             </a:r>
             <a:endParaRPr lang="en-CA" dirty="0"/>
           </a:p>
@@ -5078,55 +4804,59 @@
           <a:p>
             <a:r>
               <a:rPr lang="en-CA" dirty="0"/>
-              <a:t>What kind of training is required?</a:t>
-            </a:r>
-          </a:p>
-          <a:p>
-            <a:r>
-              <a:rPr lang="en-CA" dirty="0" smtClean="0"/>
-              <a:t>Ease </a:t>
+              <a:t>Does the system detect/isolate faults?</a:t>
+            </a:r>
+          </a:p>
+          <a:p>
+            <a:r>
+              <a:rPr lang="en-CA" dirty="0" smtClean="0"/>
+              <a:t>Mean </a:t>
             </a:r>
             <a:r>
               <a:rPr lang="en-CA" dirty="0"/>
-              <a:t>of understanding the system or user interface?</a:t>
-            </a:r>
-          </a:p>
-          <a:p>
-            <a:r>
-              <a:rPr lang="en-CA" dirty="0" smtClean="0"/>
-              <a:t>How </a:t>
+              <a:t>time between failures?</a:t>
+            </a:r>
+          </a:p>
+          <a:p>
+            <a:r>
+              <a:rPr lang="en-CA" dirty="0" smtClean="0"/>
+              <a:t>Maximum </a:t>
             </a:r>
             <a:r>
               <a:rPr lang="en-CA" dirty="0"/>
-              <a:t>difficult should it be to misuse the system?</a:t>
-            </a:r>
-          </a:p>
-          <a:p>
-            <a:pPr marL="0" indent="0">
-              <a:buNone/>
-            </a:pPr>
-            <a:endParaRPr lang="en-CA" dirty="0"/>
-          </a:p>
-          <a:p>
-            <a:endParaRPr lang="en-CA" dirty="0"/>
+              <a:t>time to recover from failure?</a:t>
+            </a:r>
+          </a:p>
+          <a:p>
+            <a:r>
+              <a:rPr lang="en-CA" dirty="0" smtClean="0"/>
+              <a:t>System </a:t>
+            </a:r>
+            <a:r>
+              <a:rPr lang="en-CA" dirty="0"/>
+              <a:t>backups?</a:t>
+            </a:r>
+          </a:p>
+          <a:p>
+            <a:endParaRPr lang="en-CA" dirty="0" smtClean="0"/>
           </a:p>
         </p:txBody>
       </p:sp>
     </p:spTree>
     <p:extLst>
       <p:ext uri="{BB962C8B-B14F-4D97-AF65-F5344CB8AC3E}">
-        <p14:creationId xmlns:p14="http://schemas.microsoft.com/office/powerpoint/2010/main" val="455335593"/>
+        <p14:creationId xmlns:p14="http://schemas.microsoft.com/office/powerpoint/2010/main" val="782269860"/>
       </p:ext>
     </p:extLst>
   </p:cSld>
   <p:clrMapOvr>
     <a:masterClrMapping/>
   </p:clrMapOvr>
-  <mc:AlternateContent xmlns:mc="http://schemas.openxmlformats.org/markup-compatibility/2006">
-    <mc:Choice xmlns:p14="http://schemas.microsoft.com/office/powerpoint/2010/main" Requires="p14">
+  <mc:AlternateContent xmlns:mc="http://schemas.openxmlformats.org/markup-compatibility/2006" xmlns:p14="http://schemas.microsoft.com/office/powerpoint/2010/main">
+    <mc:Choice Requires="p14">
       <p:transition p14:dur="0"/>
     </mc:Choice>
-    <mc:Fallback>
+    <mc:Fallback xmlns="">
       <p:transition/>
     </mc:Fallback>
   </mc:AlternateContent>
@@ -5174,7 +4904,7 @@
           <a:p>
             <a:r>
               <a:rPr lang="en-CA" dirty="0" smtClean="0"/>
-              <a:t>Usability Requirements</a:t>
+              <a:t>Precision and Accuracy Requirements</a:t>
             </a:r>
             <a:endParaRPr lang="en-CA" dirty="0"/>
           </a:p>
@@ -5197,62 +4927,25 @@
           <a:p>
             <a:r>
               <a:rPr lang="en-CA" dirty="0"/>
-              <a:t>What kind of training is required?</a:t>
-            </a:r>
-          </a:p>
-          <a:p>
-            <a:r>
-              <a:rPr lang="en-CA" dirty="0" smtClean="0"/>
-              <a:t>Ease </a:t>
+              <a:t>How accurate should calculations be?</a:t>
+            </a:r>
+          </a:p>
+          <a:p>
+            <a:r>
+              <a:rPr lang="en-CA" dirty="0" smtClean="0"/>
+              <a:t>What should </a:t>
             </a:r>
             <a:r>
               <a:rPr lang="en-CA" dirty="0"/>
-              <a:t>of understanding the system or user interface?</a:t>
-            </a:r>
-          </a:p>
-          <a:p>
-            <a:r>
-              <a:rPr lang="en-CA" dirty="0" smtClean="0"/>
-              <a:t>How </a:t>
-            </a:r>
-            <a:r>
-              <a:rPr lang="en-CA" dirty="0"/>
-              <a:t>difficult should it be to misuse the system?</a:t>
+              <a:t>be the precision of stored data</a:t>
+            </a:r>
+            <a:r>
+              <a:rPr lang="en-CA" dirty="0" smtClean="0"/>
+              <a:t>?</a:t>
             </a:r>
           </a:p>
           <a:p>
             <a:endParaRPr lang="en-CA" dirty="0" smtClean="0"/>
-          </a:p>
-          <a:p>
-            <a:r>
-              <a:rPr lang="en-CA" u="sng" dirty="0" smtClean="0"/>
-              <a:t>Examples</a:t>
-            </a:r>
-          </a:p>
-          <a:p>
-            <a:r>
-              <a:rPr lang="en-CA" dirty="0" smtClean="0"/>
-              <a:t>All </a:t>
-            </a:r>
-            <a:r>
-              <a:rPr lang="en-CA" b="1" dirty="0" smtClean="0"/>
-              <a:t>interfaces</a:t>
-            </a:r>
-            <a:r>
-              <a:rPr lang="en-CA" dirty="0" smtClean="0"/>
-              <a:t> shall use a color blind friendly color scheme to be </a:t>
-            </a:r>
-            <a:r>
-              <a:rPr lang="en-CA" b="1" dirty="0" smtClean="0"/>
-              <a:t>usable</a:t>
-            </a:r>
-            <a:r>
-              <a:rPr lang="en-CA" dirty="0" smtClean="0"/>
-              <a:t> by color blind users</a:t>
-            </a:r>
-          </a:p>
-          <a:p>
-            <a:endParaRPr lang="en-CA" dirty="0"/>
           </a:p>
           <a:p>
             <a:endParaRPr lang="en-CA" dirty="0"/>
@@ -5262,18 +4955,18 @@
     </p:spTree>
     <p:extLst>
       <p:ext uri="{BB962C8B-B14F-4D97-AF65-F5344CB8AC3E}">
-        <p14:creationId xmlns:p14="http://schemas.microsoft.com/office/powerpoint/2010/main" val="1707457212"/>
+        <p14:creationId xmlns:p14="http://schemas.microsoft.com/office/powerpoint/2010/main" val="2776228300"/>
       </p:ext>
     </p:extLst>
   </p:cSld>
   <p:clrMapOvr>
     <a:masterClrMapping/>
   </p:clrMapOvr>
-  <mc:AlternateContent xmlns:mc="http://schemas.openxmlformats.org/markup-compatibility/2006">
-    <mc:Choice xmlns:p14="http://schemas.microsoft.com/office/powerpoint/2010/main" Requires="p14">
+  <mc:AlternateContent xmlns:mc="http://schemas.openxmlformats.org/markup-compatibility/2006" xmlns:p14="http://schemas.microsoft.com/office/powerpoint/2010/main">
+    <mc:Choice Requires="p14">
       <p:transition p14:dur="0"/>
     </mc:Choice>
-    <mc:Fallback>
+    <mc:Fallback xmlns="">
       <p:transition/>
     </mc:Fallback>
   </mc:AlternateContent>
@@ -5321,7 +5014,7 @@
           <a:p>
             <a:r>
               <a:rPr lang="en-CA" dirty="0" smtClean="0"/>
-              <a:t>Security Requirement</a:t>
+              <a:t>Maintainability Requirements</a:t>
             </a:r>
             <a:endParaRPr lang="en-CA" dirty="0"/>
           </a:p>
@@ -5346,59 +5039,65 @@
           <a:p>
             <a:r>
               <a:rPr lang="en-CA" dirty="0"/>
-              <a:t>Is access to the system controlled? To all features?</a:t>
-            </a:r>
-          </a:p>
-          <a:p>
-            <a:r>
-              <a:rPr lang="en-CA" dirty="0" smtClean="0"/>
-              <a:t>Different </a:t>
+              <a:t>Will maintenance just be correcting errors, or will additional </a:t>
+            </a:r>
+            <a:r>
+              <a:rPr lang="en-CA" dirty="0" smtClean="0"/>
+              <a:t>features </a:t>
             </a:r>
             <a:r>
               <a:rPr lang="en-CA" dirty="0"/>
-              <a:t>levels of user access?</a:t>
-            </a:r>
-          </a:p>
-          <a:p>
-            <a:r>
-              <a:rPr lang="en-CA" dirty="0" smtClean="0"/>
-              <a:t>Should </a:t>
+              <a:t>be added?</a:t>
+            </a:r>
+          </a:p>
+          <a:p>
+            <a:r>
+              <a:rPr lang="en-CA" dirty="0" smtClean="0"/>
+              <a:t>How </a:t>
             </a:r>
             <a:r>
               <a:rPr lang="en-CA" dirty="0"/>
-              <a:t>portions of the system be isolated from others?</a:t>
-            </a:r>
-          </a:p>
-          <a:p>
-            <a:r>
-              <a:rPr lang="en-CA" dirty="0" smtClean="0"/>
-              <a:t>Precautions </a:t>
+              <a:t>easy should it be to add features?</a:t>
+            </a:r>
+          </a:p>
+          <a:p>
+            <a:r>
+              <a:rPr lang="en-CA" dirty="0" smtClean="0"/>
+              <a:t>How </a:t>
             </a:r>
             <a:r>
               <a:rPr lang="en-CA" dirty="0"/>
-              <a:t>against theft?</a:t>
-            </a:r>
-          </a:p>
-          <a:p>
-            <a:endParaRPr lang="en-CA" dirty="0" smtClean="0"/>
+              <a:t>easy to port to other platforms</a:t>
+            </a:r>
+            <a:r>
+              <a:rPr lang="en-CA" dirty="0" smtClean="0"/>
+              <a:t>?</a:t>
+            </a:r>
+            <a:endParaRPr lang="en-CA" u="sng" dirty="0" smtClean="0"/>
+          </a:p>
+          <a:p>
+            <a:endParaRPr lang="en-CA" u="sng" dirty="0" smtClean="0"/>
+          </a:p>
+          <a:p>
+            <a:endParaRPr lang="en-CA" dirty="0"/>
           </a:p>
         </p:txBody>
       </p:sp>
     </p:spTree>
     <p:extLst>
       <p:ext uri="{BB962C8B-B14F-4D97-AF65-F5344CB8AC3E}">
-        <p14:creationId xmlns:p14="http://schemas.microsoft.com/office/powerpoint/2010/main" val="3856216483"/>
+        <p14:creationId xmlns:p14="http://schemas.microsoft.com/office/powerpoint/2010/main" val="2762872083"/>
       </p:ext>
     </p:extLst>
   </p:cSld>
   <p:clrMapOvr>
     <a:masterClrMapping/>
   </p:clrMapOvr>
-  <mc:AlternateContent xmlns:mc="http://schemas.openxmlformats.org/markup-compatibility/2006">
-    <mc:Choice xmlns:p14="http://schemas.microsoft.com/office/powerpoint/2010/main" Requires="p14">
+  <mc:AlternateContent xmlns:mc="http://schemas.openxmlformats.org/markup-compatibility/2006" xmlns:p14="http://schemas.microsoft.com/office/powerpoint/2010/main">
+    <mc:Choice Requires="p14">
       <p:transition p14:dur="0"/>
     </mc:Choice>
-    <mc:Fallback>
+    <mc:Fallback xmlns="">
       <p:transition/>
     </mc:Fallback>
   </mc:AlternateContent>
@@ -5446,7 +5145,7 @@
           <a:p>
             <a:r>
               <a:rPr lang="en-CA" dirty="0" smtClean="0"/>
-              <a:t>Security Requirement</a:t>
+              <a:t>Writing Good Specs</a:t>
             </a:r>
             <a:endParaRPr lang="en-CA" dirty="0"/>
           </a:p>
@@ -5465,88 +5164,42 @@
         <p:spPr/>
         <p:txBody>
           <a:bodyPr>
-            <a:normAutofit lnSpcReduction="10000"/>
+            <a:normAutofit/>
           </a:bodyPr>
           <a:lstStyle/>
           <a:p>
             <a:r>
-              <a:rPr lang="en-CA" dirty="0"/>
-              <a:t>Is access to the system controlled? To all features?</a:t>
-            </a:r>
-          </a:p>
-          <a:p>
-            <a:r>
-              <a:rPr lang="en-CA" dirty="0" smtClean="0"/>
-              <a:t>Different </a:t>
-            </a:r>
-            <a:r>
-              <a:rPr lang="en-CA" dirty="0"/>
-              <a:t>levels of user access?</a:t>
-            </a:r>
-          </a:p>
-          <a:p>
-            <a:r>
-              <a:rPr lang="en-CA" dirty="0" smtClean="0"/>
-              <a:t>Should </a:t>
-            </a:r>
-            <a:r>
-              <a:rPr lang="en-CA" dirty="0"/>
-              <a:t>portions of the system be isolated from others?</a:t>
-            </a:r>
-          </a:p>
-          <a:p>
-            <a:r>
-              <a:rPr lang="en-CA" dirty="0" smtClean="0"/>
-              <a:t>Precautions </a:t>
-            </a:r>
-            <a:r>
-              <a:rPr lang="en-CA" dirty="0"/>
-              <a:t>against theft?</a:t>
-            </a:r>
-          </a:p>
-          <a:p>
-            <a:endParaRPr lang="en-CA" dirty="0" smtClean="0"/>
-          </a:p>
-          <a:p>
-            <a:r>
-              <a:rPr lang="en-CA" u="sng" dirty="0" smtClean="0"/>
-              <a:t>Examples</a:t>
-            </a:r>
-          </a:p>
-          <a:p>
-            <a:r>
-              <a:rPr lang="en-CA" dirty="0" smtClean="0"/>
-              <a:t>During the authentication, a 128bit SSL connection will be established to ensure </a:t>
-            </a:r>
-            <a:r>
-              <a:rPr lang="en-CA" b="1" dirty="0" smtClean="0"/>
-              <a:t>secure exchange </a:t>
-            </a:r>
-            <a:r>
-              <a:rPr lang="en-CA" dirty="0" smtClean="0"/>
-              <a:t>of credentials from device to </a:t>
-            </a:r>
-            <a:r>
-              <a:rPr lang="en-CA" b="1" dirty="0" smtClean="0"/>
-              <a:t>authentication</a:t>
-            </a:r>
-            <a:r>
-              <a:rPr lang="en-CA" dirty="0" smtClean="0"/>
-              <a:t> server</a:t>
-            </a:r>
-          </a:p>
-          <a:p>
-            <a:r>
-              <a:rPr lang="en-CA" dirty="0" smtClean="0"/>
-              <a:t>Upon logout, all </a:t>
-            </a:r>
-            <a:r>
-              <a:rPr lang="en-CA" b="1" dirty="0" smtClean="0"/>
-              <a:t>user specific data </a:t>
-            </a:r>
-            <a:r>
-              <a:rPr lang="en-CA" dirty="0" smtClean="0"/>
-              <a:t>will be permanently deleted from the device</a:t>
+              <a:rPr lang="en-CA" dirty="0" smtClean="0"/>
+              <a:t>Good spec qualities</a:t>
+            </a:r>
+          </a:p>
+          <a:p>
+            <a:r>
+              <a:rPr lang="en-CA" dirty="0" smtClean="0"/>
+              <a:t>Case studies</a:t>
+            </a:r>
+            <a:endParaRPr lang="en-CA" dirty="0"/>
+          </a:p>
+        </p:txBody>
+      </p:sp>
+      <p:sp>
+        <p:nvSpPr>
+          <p:cNvPr id="4" name="Text Placeholder 3"/>
+          <p:cNvSpPr>
+            <a:spLocks noGrp="1"/>
+          </p:cNvSpPr>
+          <p:nvPr>
+            <p:ph type="body" sz="half" idx="2"/>
+          </p:nvPr>
+        </p:nvSpPr>
+        <p:spPr/>
+        <p:txBody>
+          <a:bodyPr/>
+          <a:lstStyle/>
+          <a:p>
+            <a:r>
+              <a:rPr lang="en-CA" dirty="0" smtClean="0"/>
+              <a:t>Best Practices</a:t>
             </a:r>
             <a:endParaRPr lang="en-CA" dirty="0"/>
           </a:p>
@@ -5555,18 +5208,18 @@
     </p:spTree>
     <p:extLst>
       <p:ext uri="{BB962C8B-B14F-4D97-AF65-F5344CB8AC3E}">
-        <p14:creationId xmlns:p14="http://schemas.microsoft.com/office/powerpoint/2010/main" val="4062958227"/>
+        <p14:creationId xmlns:p14="http://schemas.microsoft.com/office/powerpoint/2010/main" val="244446303"/>
       </p:ext>
     </p:extLst>
   </p:cSld>
   <p:clrMapOvr>
     <a:masterClrMapping/>
   </p:clrMapOvr>
-  <mc:AlternateContent xmlns:mc="http://schemas.openxmlformats.org/markup-compatibility/2006">
-    <mc:Choice xmlns:p14="http://schemas.microsoft.com/office/powerpoint/2010/main" Requires="p14">
+  <mc:AlternateContent xmlns:mc="http://schemas.openxmlformats.org/markup-compatibility/2006" xmlns:p14="http://schemas.microsoft.com/office/powerpoint/2010/main">
+    <mc:Choice Requires="p14">
       <p:transition p14:dur="0"/>
     </mc:Choice>
-    <mc:Fallback>
+    <mc:Fallback xmlns="">
       <p:transition/>
     </mc:Fallback>
   </mc:AlternateContent>
@@ -5614,7 +5267,7 @@
           <a:p>
             <a:r>
               <a:rPr lang="en-CA" dirty="0" smtClean="0"/>
-              <a:t>Reliability and Availability Requirements</a:t>
+              <a:t>Qualities of a good spec</a:t>
             </a:r>
             <a:endParaRPr lang="en-CA" dirty="0"/>
           </a:p>
@@ -5622,7 +5275,7 @@
       </p:sp>
       <p:sp>
         <p:nvSpPr>
-          <p:cNvPr id="3" name="Content Placeholder 2"/>
+          <p:cNvPr id="4" name="Content Placeholder 2"/>
           <p:cNvSpPr>
             <a:spLocks noGrp="1"/>
           </p:cNvSpPr>
@@ -5630,66 +5283,115 @@
             <p:ph idx="1"/>
           </p:nvPr>
         </p:nvSpPr>
-        <p:spPr/>
-        <p:txBody>
-          <a:bodyPr/>
-          <a:lstStyle/>
-          <a:p>
-            <a:r>
-              <a:rPr lang="en-CA" dirty="0"/>
-              <a:t>Does the system detect/isolate faults?</a:t>
-            </a:r>
-          </a:p>
-          <a:p>
-            <a:r>
-              <a:rPr lang="en-CA" dirty="0" smtClean="0"/>
-              <a:t>Mean </a:t>
-            </a:r>
-            <a:r>
-              <a:rPr lang="en-CA" dirty="0"/>
-              <a:t>time between failures?</a:t>
-            </a:r>
-          </a:p>
-          <a:p>
-            <a:r>
-              <a:rPr lang="en-CA" dirty="0" smtClean="0"/>
-              <a:t>Maximum </a:t>
-            </a:r>
-            <a:r>
-              <a:rPr lang="en-CA" dirty="0"/>
-              <a:t>time to recover from failure?</a:t>
-            </a:r>
-          </a:p>
-          <a:p>
-            <a:r>
-              <a:rPr lang="en-CA" dirty="0" smtClean="0"/>
-              <a:t>System </a:t>
-            </a:r>
-            <a:r>
-              <a:rPr lang="en-CA" dirty="0"/>
-              <a:t>backups?</a:t>
-            </a:r>
-          </a:p>
-          <a:p>
-            <a:endParaRPr lang="en-CA" dirty="0" smtClean="0"/>
+        <p:spPr>
+          <a:xfrm>
+            <a:off x="676274" y="2157731"/>
+            <a:ext cx="10753725" cy="3766185"/>
+          </a:xfrm>
+        </p:spPr>
+        <p:txBody>
+          <a:bodyPr>
+            <a:normAutofit lnSpcReduction="10000"/>
+          </a:bodyPr>
+          <a:lstStyle/>
+          <a:p>
+            <a:r>
+              <a:rPr lang="en-CA" b="1" dirty="0" smtClean="0"/>
+              <a:t>Consistent</a:t>
+            </a:r>
+            <a:r>
+              <a:rPr lang="en-CA" dirty="0" smtClean="0"/>
+              <a:t>: No conflicting requirements</a:t>
+            </a:r>
+          </a:p>
+          <a:p>
+            <a:r>
+              <a:rPr lang="en-CA" b="1" dirty="0" smtClean="0"/>
+              <a:t>Unambiguous</a:t>
+            </a:r>
+            <a:r>
+              <a:rPr lang="en-CA" dirty="0" smtClean="0"/>
+              <a:t>: avoid multiple interpretation</a:t>
+            </a:r>
+          </a:p>
+          <a:p>
+            <a:r>
+              <a:rPr lang="en-CA" b="1" dirty="0" smtClean="0"/>
+              <a:t>Complete</a:t>
+            </a:r>
+            <a:r>
+              <a:rPr lang="en-CA" dirty="0" smtClean="0"/>
+              <a:t>: All behaviour and state is specified</a:t>
+            </a:r>
+          </a:p>
+          <a:p>
+            <a:r>
+              <a:rPr lang="en-CA" b="1" dirty="0" smtClean="0"/>
+              <a:t>Feasible</a:t>
+            </a:r>
+            <a:r>
+              <a:rPr lang="en-CA" dirty="0" smtClean="0"/>
+              <a:t>: It is possible to build a solution that meets the customer’s needs</a:t>
+            </a:r>
+          </a:p>
+          <a:p>
+            <a:r>
+              <a:rPr lang="en-CA" b="1" dirty="0" smtClean="0"/>
+              <a:t>Relevant</a:t>
+            </a:r>
+            <a:r>
+              <a:rPr lang="en-CA" dirty="0" smtClean="0"/>
+              <a:t>: All features are directly related to customer’s need</a:t>
+            </a:r>
+          </a:p>
+          <a:p>
+            <a:r>
+              <a:rPr lang="en-CA" b="1" dirty="0" smtClean="0"/>
+              <a:t>Testable</a:t>
+            </a:r>
+            <a:r>
+              <a:rPr lang="en-CA" dirty="0" smtClean="0"/>
+              <a:t>: Requirement should suggest a test that could demonstrate requirement is met</a:t>
+            </a:r>
+          </a:p>
+          <a:p>
+            <a:r>
+              <a:rPr lang="en-CA" b="1" dirty="0" smtClean="0"/>
+              <a:t>Traceable</a:t>
+            </a:r>
+            <a:r>
+              <a:rPr lang="en-CA" dirty="0" smtClean="0"/>
+              <a:t>: Organized an uniquely labeled</a:t>
+            </a:r>
+          </a:p>
+          <a:p>
+            <a:r>
+              <a:rPr lang="en-CA" b="1" dirty="0" smtClean="0"/>
+              <a:t>Design Free</a:t>
+            </a:r>
+            <a:r>
+              <a:rPr lang="en-CA" dirty="0" smtClean="0"/>
+              <a:t>: No implementation details</a:t>
+            </a:r>
+            <a:endParaRPr lang="en-CA" dirty="0"/>
           </a:p>
         </p:txBody>
       </p:sp>
     </p:spTree>
     <p:extLst>
       <p:ext uri="{BB962C8B-B14F-4D97-AF65-F5344CB8AC3E}">
-        <p14:creationId xmlns:p14="http://schemas.microsoft.com/office/powerpoint/2010/main" val="782269860"/>
+        <p14:creationId xmlns:p14="http://schemas.microsoft.com/office/powerpoint/2010/main" val="2536603457"/>
       </p:ext>
     </p:extLst>
   </p:cSld>
   <p:clrMapOvr>
     <a:masterClrMapping/>
   </p:clrMapOvr>
-  <mc:AlternateContent xmlns:mc="http://schemas.openxmlformats.org/markup-compatibility/2006">
-    <mc:Choice xmlns:p14="http://schemas.microsoft.com/office/powerpoint/2010/main" Requires="p14">
+  <mc:AlternateContent xmlns:mc="http://schemas.openxmlformats.org/markup-compatibility/2006" xmlns:p14="http://schemas.microsoft.com/office/powerpoint/2010/main">
+    <mc:Choice Requires="p14">
       <p:transition p14:dur="0"/>
     </mc:Choice>
-    <mc:Fallback>
+    <mc:Fallback xmlns="">
       <p:transition/>
     </mc:Fallback>
   </mc:AlternateContent>
@@ -5737,7 +5439,7 @@
           <a:p>
             <a:r>
               <a:rPr lang="en-CA" dirty="0" smtClean="0"/>
-              <a:t>Reliability and Availability Requirements</a:t>
+              <a:t>Example 1</a:t>
             </a:r>
             <a:endParaRPr lang="en-CA" dirty="0"/>
           </a:p>
@@ -5753,86 +5455,67 @@
             <p:ph idx="1"/>
           </p:nvPr>
         </p:nvSpPr>
-        <p:spPr/>
-        <p:txBody>
-          <a:bodyPr/>
-          <a:lstStyle/>
-          <a:p>
-            <a:r>
-              <a:rPr lang="en-CA" dirty="0"/>
-              <a:t>Does the system detect/isolate faults?</a:t>
-            </a:r>
-          </a:p>
-          <a:p>
-            <a:r>
-              <a:rPr lang="en-CA" dirty="0" smtClean="0"/>
-              <a:t>Mean </a:t>
-            </a:r>
-            <a:r>
-              <a:rPr lang="en-CA" dirty="0"/>
-              <a:t>time between failures?</a:t>
-            </a:r>
-          </a:p>
-          <a:p>
-            <a:r>
-              <a:rPr lang="en-CA" dirty="0" smtClean="0"/>
-              <a:t>Maximum </a:t>
-            </a:r>
-            <a:r>
-              <a:rPr lang="en-CA" dirty="0"/>
-              <a:t>time to recover from failure?</a:t>
-            </a:r>
-          </a:p>
-          <a:p>
-            <a:r>
-              <a:rPr lang="en-CA" dirty="0" smtClean="0"/>
-              <a:t>System </a:t>
-            </a:r>
-            <a:r>
-              <a:rPr lang="en-CA" dirty="0"/>
-              <a:t>backups?</a:t>
-            </a:r>
-          </a:p>
-          <a:p>
+        <p:spPr>
+          <a:xfrm>
+            <a:off x="676274" y="2157731"/>
+            <a:ext cx="10753725" cy="3766185"/>
+          </a:xfrm>
+        </p:spPr>
+        <p:txBody>
+          <a:bodyPr/>
+          <a:lstStyle/>
+          <a:p>
+            <a:pPr marL="0" indent="0">
+              <a:buNone/>
+            </a:pPr>
+            <a:r>
+              <a:rPr lang="en-CA" dirty="0" smtClean="0"/>
+              <a:t>2.1 Login Screen</a:t>
+            </a:r>
+          </a:p>
+          <a:p>
+            <a:pPr marL="0" indent="0">
+              <a:buNone/>
+            </a:pPr>
+            <a:r>
+              <a:rPr lang="en-CA" dirty="0" smtClean="0"/>
+              <a:t>2.1.2 The login screen shall have an input field for username and password and a button for submitting the information. </a:t>
+            </a:r>
+          </a:p>
+          <a:p>
+            <a:pPr marL="0" indent="0">
+              <a:buNone/>
+            </a:pPr>
+            <a:r>
+              <a:rPr lang="en-CA" dirty="0" smtClean="0"/>
+              <a:t>2.1.3 The password shall also be obfuscated such that an onlooker will not able to read the typed message. </a:t>
+            </a:r>
+          </a:p>
+          <a:p>
+            <a:pPr marL="0" indent="0">
+              <a:buNone/>
+            </a:pPr>
+            <a:r>
+              <a:rPr lang="en-CA" dirty="0" smtClean="0"/>
+              <a:t>2.1.3 The login screen will lock the app after detecting any significant attempts to hack into the app.</a:t>
+            </a:r>
+          </a:p>
+          <a:p>
+            <a:pPr marL="0" indent="0">
+              <a:buNone/>
+            </a:pPr>
             <a:endParaRPr lang="en-CA" dirty="0" smtClean="0"/>
           </a:p>
           <a:p>
-            <a:r>
-              <a:rPr lang="en-CA" u="sng" dirty="0" smtClean="0"/>
-              <a:t>Examples</a:t>
-            </a:r>
-          </a:p>
-          <a:p>
-            <a:r>
-              <a:rPr lang="en-CA" dirty="0"/>
-              <a:t>Messages will show a </a:t>
-            </a:r>
-            <a:r>
-              <a:rPr lang="en-CA" b="1" dirty="0"/>
-              <a:t>delivery receipt </a:t>
-            </a:r>
-            <a:r>
-              <a:rPr lang="en-CA" dirty="0"/>
-              <a:t>in order to indicate successful </a:t>
-            </a:r>
-            <a:r>
-              <a:rPr lang="en-CA" dirty="0" smtClean="0"/>
-              <a:t>delivery</a:t>
-            </a:r>
-          </a:p>
-          <a:p>
-            <a:r>
-              <a:rPr lang="en-CA" dirty="0" smtClean="0"/>
-              <a:t>User’s messages will be stored in </a:t>
-            </a:r>
-            <a:r>
-              <a:rPr lang="en-CA" b="1" dirty="0" smtClean="0"/>
-              <a:t>two separate</a:t>
-            </a:r>
-            <a:r>
-              <a:rPr lang="en-CA" dirty="0" smtClean="0"/>
-              <a:t> data centers to prevent data loss</a:t>
-            </a:r>
+            <a:pPr marL="0" indent="0">
+              <a:buNone/>
+            </a:pPr>
+            <a:endParaRPr lang="en-CA" dirty="0"/>
+          </a:p>
+          <a:p>
+            <a:pPr marL="0" indent="0">
+              <a:buNone/>
+            </a:pPr>
             <a:endParaRPr lang="en-CA" dirty="0"/>
           </a:p>
         </p:txBody>
@@ -5840,18 +5523,18 @@
     </p:spTree>
     <p:extLst>
       <p:ext uri="{BB962C8B-B14F-4D97-AF65-F5344CB8AC3E}">
-        <p14:creationId xmlns:p14="http://schemas.microsoft.com/office/powerpoint/2010/main" val="322043405"/>
+        <p14:creationId xmlns:p14="http://schemas.microsoft.com/office/powerpoint/2010/main" val="3527470307"/>
       </p:ext>
     </p:extLst>
   </p:cSld>
   <p:clrMapOvr>
     <a:masterClrMapping/>
   </p:clrMapOvr>
-  <mc:AlternateContent xmlns:mc="http://schemas.openxmlformats.org/markup-compatibility/2006">
-    <mc:Choice xmlns:p14="http://schemas.microsoft.com/office/powerpoint/2010/main" Requires="p14">
+  <mc:AlternateContent xmlns:mc="http://schemas.openxmlformats.org/markup-compatibility/2006" xmlns:p14="http://schemas.microsoft.com/office/powerpoint/2010/main">
+    <mc:Choice Requires="p14">
       <p:transition p14:dur="0"/>
     </mc:Choice>
-    <mc:Fallback>
+    <mc:Fallback xmlns="">
       <p:transition/>
     </mc:Fallback>
   </mc:AlternateContent>
@@ -5899,7 +5582,7 @@
           <a:p>
             <a:r>
               <a:rPr lang="en-CA" dirty="0" smtClean="0"/>
-              <a:t>Precision and Accuracy Requirements</a:t>
+              <a:t>Example 2</a:t>
             </a:r>
             <a:endParaRPr lang="en-CA" dirty="0"/>
           </a:p>
@@ -5917,30 +5600,73 @@
         </p:nvSpPr>
         <p:spPr/>
         <p:txBody>
-          <a:bodyPr/>
-          <a:lstStyle/>
-          <a:p>
-            <a:r>
-              <a:rPr lang="en-CA" dirty="0"/>
-              <a:t>How accurate should calculations be?</a:t>
-            </a:r>
-          </a:p>
-          <a:p>
-            <a:r>
-              <a:rPr lang="en-CA" dirty="0" smtClean="0"/>
-              <a:t>What should </a:t>
-            </a:r>
-            <a:r>
-              <a:rPr lang="en-CA" dirty="0"/>
-              <a:t>be the precision of stored data</a:t>
-            </a:r>
-            <a:r>
-              <a:rPr lang="en-CA" dirty="0" smtClean="0"/>
-              <a:t>?</a:t>
-            </a:r>
-          </a:p>
-          <a:p>
-            <a:endParaRPr lang="en-CA" dirty="0" smtClean="0"/>
+          <a:bodyPr>
+            <a:normAutofit lnSpcReduction="10000"/>
+          </a:bodyPr>
+          <a:lstStyle/>
+          <a:p>
+            <a:r>
+              <a:rPr lang="en-CA" dirty="0" smtClean="0"/>
+              <a:t>3.1 </a:t>
+            </a:r>
+            <a:r>
+              <a:rPr lang="en-CA" b="1" dirty="0" smtClean="0"/>
+              <a:t>File Transfers</a:t>
+            </a:r>
+          </a:p>
+          <a:p>
+            <a:r>
+              <a:rPr lang="en-CA" dirty="0" smtClean="0"/>
+              <a:t>3.1.1 </a:t>
+            </a:r>
+            <a:r>
+              <a:rPr lang="en-CA" b="1" dirty="0" smtClean="0"/>
+              <a:t>File Types</a:t>
+            </a:r>
+          </a:p>
+          <a:p>
+            <a:r>
+              <a:rPr lang="en-CA" dirty="0" smtClean="0"/>
+              <a:t>Only files with .jpg extension can be sent</a:t>
+            </a:r>
+          </a:p>
+          <a:p>
+            <a:r>
+              <a:rPr lang="en-CA" dirty="0" smtClean="0"/>
+              <a:t>3.1.2 </a:t>
+            </a:r>
+            <a:r>
+              <a:rPr lang="en-CA" b="1" dirty="0" smtClean="0"/>
+              <a:t>File size</a:t>
+            </a:r>
+          </a:p>
+          <a:p>
+            <a:r>
+              <a:rPr lang="en-CA" dirty="0" smtClean="0"/>
+              <a:t>Files cannot Exceed 100kb</a:t>
+            </a:r>
+          </a:p>
+          <a:p>
+            <a:r>
+              <a:rPr lang="en-CA" dirty="0" smtClean="0"/>
+              <a:t>3.1.3 </a:t>
+            </a:r>
+            <a:r>
+              <a:rPr lang="en-CA" b="1" dirty="0" smtClean="0"/>
+              <a:t>Analytics &amp; Reporting</a:t>
+            </a:r>
+          </a:p>
+          <a:p>
+            <a:r>
+              <a:rPr lang="en-CA" dirty="0" smtClean="0"/>
+              <a:t>Collect File transfer rate in nano seconds as a Key Performance indicator using Google Analytics library</a:t>
+            </a:r>
+          </a:p>
+          <a:p>
+            <a:r>
+              <a:rPr lang="en-CA" dirty="0" smtClean="0"/>
+              <a:t>3.1.4 …..</a:t>
+            </a:r>
           </a:p>
           <a:p>
             <a:endParaRPr lang="en-CA" dirty="0"/>
@@ -5950,18 +5676,18 @@
     </p:spTree>
     <p:extLst>
       <p:ext uri="{BB962C8B-B14F-4D97-AF65-F5344CB8AC3E}">
-        <p14:creationId xmlns:p14="http://schemas.microsoft.com/office/powerpoint/2010/main" val="2776228300"/>
+        <p14:creationId xmlns:p14="http://schemas.microsoft.com/office/powerpoint/2010/main" val="2101398176"/>
       </p:ext>
     </p:extLst>
   </p:cSld>
   <p:clrMapOvr>
     <a:masterClrMapping/>
   </p:clrMapOvr>
-  <mc:AlternateContent xmlns:mc="http://schemas.openxmlformats.org/markup-compatibility/2006">
-    <mc:Choice xmlns:p14="http://schemas.microsoft.com/office/powerpoint/2010/main" Requires="p14">
+  <mc:AlternateContent xmlns:mc="http://schemas.openxmlformats.org/markup-compatibility/2006" xmlns:p14="http://schemas.microsoft.com/office/powerpoint/2010/main">
+    <mc:Choice Requires="p14">
       <p:transition p14:dur="0"/>
     </mc:Choice>
-    <mc:Fallback>
+    <mc:Fallback xmlns="">
       <p:transition/>
     </mc:Fallback>
   </mc:AlternateContent>
@@ -6009,7 +5735,7 @@
           <a:p>
             <a:r>
               <a:rPr lang="en-CA" dirty="0" smtClean="0"/>
-              <a:t>Precision and Accuracy Requirements</a:t>
+              <a:t>Example 3</a:t>
             </a:r>
             <a:endParaRPr lang="en-CA" dirty="0"/>
           </a:p>
@@ -6025,85 +5751,51 @@
             <p:ph idx="1"/>
           </p:nvPr>
         </p:nvSpPr>
-        <p:spPr/>
+        <p:spPr>
+          <a:xfrm>
+            <a:off x="676274" y="2104139"/>
+            <a:ext cx="10753725" cy="3766185"/>
+          </a:xfrm>
+        </p:spPr>
         <p:txBody>
           <a:bodyPr/>
           <a:lstStyle/>
           <a:p>
             <a:r>
               <a:rPr lang="en-CA" dirty="0"/>
-              <a:t>How accurate should calculations be?</a:t>
-            </a:r>
-          </a:p>
-          <a:p>
-            <a:r>
-              <a:rPr lang="en-CA" dirty="0" smtClean="0"/>
-              <a:t>What should </a:t>
+              <a:t>Expert Video: </a:t>
+            </a:r>
+            <a:r>
+              <a:rPr lang="en-CA" dirty="0">
+                <a:hlinkClick r:id="rId2"/>
+              </a:rPr>
+              <a:t>https://www.youtube.com/watch?v=BKorP55Aqvg</a:t>
             </a:r>
             <a:r>
               <a:rPr lang="en-CA" dirty="0"/>
-              <a:t>be the precision of stored data</a:t>
-            </a:r>
-            <a:r>
-              <a:rPr lang="en-CA" dirty="0" smtClean="0"/>
-              <a:t>?</a:t>
-            </a:r>
-          </a:p>
-          <a:p>
-            <a:endParaRPr lang="en-CA" dirty="0" smtClean="0"/>
+              <a:t> </a:t>
+            </a:r>
           </a:p>
           <a:p>
             <a:endParaRPr lang="en-CA" dirty="0"/>
-          </a:p>
-          <a:p>
-            <a:r>
-              <a:rPr lang="en-CA" u="sng" dirty="0" smtClean="0"/>
-              <a:t>Examples</a:t>
-            </a:r>
-          </a:p>
-          <a:p>
-            <a:r>
-              <a:rPr lang="en-CA" dirty="0" smtClean="0"/>
-              <a:t>Messages saved on the device will be </a:t>
-            </a:r>
-            <a:r>
-              <a:rPr lang="en-CA" b="1" dirty="0" smtClean="0"/>
-              <a:t>stored using</a:t>
-            </a:r>
-            <a:r>
-              <a:rPr lang="en-CA" dirty="0" smtClean="0"/>
-              <a:t> base 64 encoding</a:t>
-            </a:r>
-            <a:endParaRPr lang="en-CA" dirty="0"/>
-          </a:p>
-          <a:p>
-            <a:r>
-              <a:rPr lang="en-CA" dirty="0" smtClean="0"/>
-              <a:t>When location service is enabled, messages shall display users location based on </a:t>
-            </a:r>
-            <a:r>
-              <a:rPr lang="en-CA" b="1" dirty="0" smtClean="0"/>
-              <a:t>city</a:t>
-            </a:r>
-            <a:endParaRPr lang="en-CA" b="1" dirty="0"/>
           </a:p>
         </p:txBody>
       </p:sp>
     </p:spTree>
     <p:extLst>
       <p:ext uri="{BB962C8B-B14F-4D97-AF65-F5344CB8AC3E}">
-        <p14:creationId xmlns:p14="http://schemas.microsoft.com/office/powerpoint/2010/main" val="4087193604"/>
+        <p14:creationId xmlns:p14="http://schemas.microsoft.com/office/powerpoint/2010/main" val="2097510329"/>
       </p:ext>
     </p:extLst>
   </p:cSld>
   <p:clrMapOvr>
     <a:masterClrMapping/>
   </p:clrMapOvr>
-  <mc:AlternateContent xmlns:mc="http://schemas.openxmlformats.org/markup-compatibility/2006">
-    <mc:Choice xmlns:p14="http://schemas.microsoft.com/office/powerpoint/2010/main" Requires="p14">
+  <mc:AlternateContent xmlns:mc="http://schemas.openxmlformats.org/markup-compatibility/2006" xmlns:p14="http://schemas.microsoft.com/office/powerpoint/2010/main">
+    <mc:Choice Requires="p14">
       <p:transition p14:dur="0"/>
     </mc:Choice>
-    <mc:Fallback>
+    <mc:Fallback xmlns="">
       <p:transition/>
     </mc:Fallback>
   </mc:AlternateContent>
@@ -6240,11 +5932,11 @@
   <p:clrMapOvr>
     <a:masterClrMapping/>
   </p:clrMapOvr>
-  <mc:AlternateContent xmlns:mc="http://schemas.openxmlformats.org/markup-compatibility/2006">
-    <mc:Choice xmlns:p14="http://schemas.microsoft.com/office/powerpoint/2010/main" Requires="p14">
+  <mc:AlternateContent xmlns:mc="http://schemas.openxmlformats.org/markup-compatibility/2006" xmlns:p14="http://schemas.microsoft.com/office/powerpoint/2010/main">
+    <mc:Choice Requires="p14">
       <p:transition p14:dur="0"/>
     </mc:Choice>
-    <mc:Fallback>
+    <mc:Fallback xmlns="">
       <p:transition/>
     </mc:Fallback>
   </mc:AlternateContent>
@@ -6292,7 +5984,7 @@
           <a:p>
             <a:r>
               <a:rPr lang="en-CA" dirty="0" smtClean="0"/>
-              <a:t>Maintainability Requirements</a:t>
+              <a:t>Extra Credit</a:t>
             </a:r>
             <a:endParaRPr lang="en-CA" dirty="0"/>
           </a:p>
@@ -6310,53 +6002,55 @@
         </p:nvSpPr>
         <p:spPr/>
         <p:txBody>
-          <a:bodyPr>
-            <a:normAutofit/>
-          </a:bodyPr>
-          <a:lstStyle/>
-          <a:p>
+          <a:bodyPr/>
+          <a:lstStyle/>
+          <a:p>
+            <a:r>
+              <a:rPr lang="en-CA" dirty="0" smtClean="0"/>
+              <a:t>Expert Video</a:t>
+            </a:r>
             <a:r>
               <a:rPr lang="en-CA" dirty="0"/>
-              <a:t>Will maintenance just be correcting errors, or will additional </a:t>
-            </a:r>
-            <a:r>
-              <a:rPr lang="en-CA" dirty="0" smtClean="0"/>
-              <a:t>features </a:t>
-            </a:r>
+              <a:t>: </a:t>
+            </a:r>
+            <a:r>
+              <a:rPr lang="en-CA" dirty="0">
+                <a:hlinkClick r:id="rId2"/>
+              </a:rPr>
+              <a:t>https://</a:t>
+            </a:r>
+            <a:r>
+              <a:rPr lang="en-CA" dirty="0" smtClean="0">
+                <a:hlinkClick r:id="rId2"/>
+              </a:rPr>
+              <a:t>www.youtube.com/watch?v=BKorP55Aqvg</a:t>
+            </a:r>
+            <a:r>
+              <a:rPr lang="en-CA" dirty="0" smtClean="0"/>
+              <a:t> </a:t>
+            </a:r>
+          </a:p>
+          <a:p>
             <a:r>
               <a:rPr lang="en-CA" dirty="0"/>
-              <a:t>be added?</a:t>
-            </a:r>
-          </a:p>
-          <a:p>
-            <a:r>
-              <a:rPr lang="en-CA" dirty="0" smtClean="0"/>
-              <a:t>How </a:t>
-            </a:r>
-            <a:r>
-              <a:rPr lang="en-CA" dirty="0"/>
-              <a:t>easy should it be to add features?</a:t>
-            </a:r>
-          </a:p>
-          <a:p>
-            <a:r>
-              <a:rPr lang="en-CA" dirty="0" smtClean="0"/>
-              <a:t>How </a:t>
-            </a:r>
-            <a:r>
-              <a:rPr lang="en-CA" dirty="0"/>
-              <a:t>easy to port to other platforms</a:t>
-            </a:r>
-            <a:r>
-              <a:rPr lang="en-CA" dirty="0" smtClean="0"/>
-              <a:t>?</a:t>
-            </a:r>
-            <a:endParaRPr lang="en-CA" u="sng" dirty="0" smtClean="0"/>
-          </a:p>
-          <a:p>
-            <a:endParaRPr lang="en-CA" u="sng" dirty="0" smtClean="0"/>
-          </a:p>
-          <a:p>
+              <a:t>Ruby Spec: </a:t>
+            </a:r>
+            <a:r>
+              <a:rPr lang="en-CA" dirty="0">
+                <a:hlinkClick r:id="rId3"/>
+              </a:rPr>
+              <a:t>http://</a:t>
+            </a:r>
+            <a:r>
+              <a:rPr lang="en-CA" dirty="0" smtClean="0">
+                <a:hlinkClick r:id="rId3"/>
+              </a:rPr>
+              <a:t>vk.com/video1678620_163231929</a:t>
+            </a:r>
+            <a:r>
+              <a:rPr lang="en-CA" dirty="0" smtClean="0"/>
+              <a:t> </a:t>
+            </a:r>
             <a:endParaRPr lang="en-CA" dirty="0"/>
           </a:p>
         </p:txBody>
@@ -6364,18 +6058,18 @@
     </p:spTree>
     <p:extLst>
       <p:ext uri="{BB962C8B-B14F-4D97-AF65-F5344CB8AC3E}">
-        <p14:creationId xmlns:p14="http://schemas.microsoft.com/office/powerpoint/2010/main" val="2762872083"/>
+        <p14:creationId xmlns:p14="http://schemas.microsoft.com/office/powerpoint/2010/main" val="3758018437"/>
       </p:ext>
     </p:extLst>
   </p:cSld>
   <p:clrMapOvr>
     <a:masterClrMapping/>
   </p:clrMapOvr>
-  <mc:AlternateContent xmlns:mc="http://schemas.openxmlformats.org/markup-compatibility/2006">
-    <mc:Choice xmlns:p14="http://schemas.microsoft.com/office/powerpoint/2010/main" Requires="p14">
+  <mc:AlternateContent xmlns:mc="http://schemas.openxmlformats.org/markup-compatibility/2006" xmlns:p14="http://schemas.microsoft.com/office/powerpoint/2010/main">
+    <mc:Choice Requires="p14">
       <p:transition p14:dur="0"/>
     </mc:Choice>
-    <mc:Fallback>
+    <mc:Fallback xmlns="">
       <p:transition/>
     </mc:Fallback>
   </mc:AlternateContent>
@@ -6423,7 +6117,7 @@
           <a:p>
             <a:r>
               <a:rPr lang="en-CA" dirty="0" smtClean="0"/>
-              <a:t>Maintainability Requirements</a:t>
+              <a:t>References</a:t>
             </a:r>
             <a:endParaRPr lang="en-CA" dirty="0"/>
           </a:p>
@@ -6441,92 +6135,66 @@
         </p:nvSpPr>
         <p:spPr/>
         <p:txBody>
-          <a:bodyPr>
-            <a:normAutofit lnSpcReduction="10000"/>
-          </a:bodyPr>
-          <a:lstStyle/>
-          <a:p>
-            <a:r>
-              <a:rPr lang="en-CA" dirty="0"/>
-              <a:t>Will maintenance just be correcting errors, or will additional </a:t>
-            </a:r>
-            <a:r>
-              <a:rPr lang="en-CA" dirty="0" smtClean="0"/>
-              <a:t>features </a:t>
-            </a:r>
-            <a:r>
-              <a:rPr lang="en-CA" dirty="0"/>
-              <a:t>be added?</a:t>
-            </a:r>
-          </a:p>
-          <a:p>
-            <a:r>
-              <a:rPr lang="en-CA" dirty="0" smtClean="0"/>
-              <a:t>How </a:t>
-            </a:r>
-            <a:r>
-              <a:rPr lang="en-CA" dirty="0"/>
-              <a:t>easy should it be to add features?</a:t>
-            </a:r>
-          </a:p>
-          <a:p>
-            <a:r>
-              <a:rPr lang="en-CA" dirty="0" smtClean="0"/>
-              <a:t>How </a:t>
-            </a:r>
-            <a:r>
-              <a:rPr lang="en-CA" dirty="0"/>
-              <a:t>easy to port to other platforms</a:t>
-            </a:r>
-            <a:r>
-              <a:rPr lang="en-CA" dirty="0" smtClean="0"/>
-              <a:t>?</a:t>
-            </a:r>
-            <a:endParaRPr lang="en-CA" u="sng" dirty="0" smtClean="0"/>
-          </a:p>
-          <a:p>
-            <a:endParaRPr lang="en-CA" u="sng" dirty="0" smtClean="0"/>
-          </a:p>
-          <a:p>
-            <a:r>
-              <a:rPr lang="en-CA" u="sng" dirty="0" smtClean="0"/>
-              <a:t>Examples</a:t>
-            </a:r>
-          </a:p>
-          <a:p>
-            <a:r>
-              <a:rPr lang="en-CA" dirty="0" smtClean="0"/>
-              <a:t>Messages will pass through Facebook Messaging </a:t>
-            </a:r>
-            <a:r>
-              <a:rPr lang="en-CA" b="1" dirty="0" smtClean="0"/>
-              <a:t>servers</a:t>
-            </a:r>
-            <a:r>
-              <a:rPr lang="en-CA" dirty="0" smtClean="0"/>
-              <a:t> rather than device to device in order to ensure </a:t>
-            </a:r>
-            <a:r>
-              <a:rPr lang="en-CA" b="1" dirty="0" smtClean="0"/>
-              <a:t>maintainability</a:t>
-            </a:r>
-            <a:r>
-              <a:rPr lang="en-CA" dirty="0" smtClean="0"/>
-              <a:t> of message delivery and storage requirements</a:t>
-            </a:r>
-          </a:p>
-          <a:p>
-            <a:r>
-              <a:rPr lang="en-CA" dirty="0" smtClean="0"/>
-              <a:t>Android, iOS, Windows and web devices shall connect to the same messaging servers in order to centralize </a:t>
-            </a:r>
-            <a:r>
-              <a:rPr lang="en-CA" b="1" dirty="0" smtClean="0"/>
-              <a:t>maintenance</a:t>
-            </a:r>
-            <a:r>
-              <a:rPr lang="en-CA" dirty="0" smtClean="0"/>
-              <a:t> of message delivery and storage.</a:t>
+          <a:bodyPr/>
+          <a:lstStyle/>
+          <a:p>
+            <a:pPr marL="457200" indent="-457200">
+              <a:buFont typeface="+mj-lt"/>
+              <a:buAutoNum type="arabicPeriod"/>
+            </a:pPr>
+            <a:r>
+              <a:rPr lang="en-CA" dirty="0">
+                <a:hlinkClick r:id="rId2"/>
+              </a:rPr>
+              <a:t>https://</a:t>
+            </a:r>
+            <a:r>
+              <a:rPr lang="en-CA" dirty="0" smtClean="0">
+                <a:hlinkClick r:id="rId2"/>
+              </a:rPr>
+              <a:t>www.ibm.com/developerworks/community/blogs/requirementsmanagement/entry/good-requirements-writing?lang=en</a:t>
+            </a:r>
+            <a:endParaRPr lang="en-CA" dirty="0" smtClean="0"/>
+          </a:p>
+          <a:p>
+            <a:pPr marL="457200" indent="-457200">
+              <a:buFont typeface="+mj-lt"/>
+              <a:buAutoNum type="arabicPeriod"/>
+            </a:pPr>
+            <a:r>
+              <a:rPr lang="en-CA" dirty="0">
+                <a:hlinkClick r:id="rId3"/>
+              </a:rPr>
+              <a:t>http://</a:t>
+            </a:r>
+            <a:r>
+              <a:rPr lang="en-CA" dirty="0" smtClean="0">
+                <a:hlinkClick r:id="rId3"/>
+              </a:rPr>
+              <a:t>www.incose.org/chicagoland/docs/Writing%20Effective%20Requirements.pdf</a:t>
+            </a:r>
+            <a:endParaRPr lang="en-CA" dirty="0" smtClean="0"/>
+          </a:p>
+          <a:p>
+            <a:pPr marL="457200" indent="-457200">
+              <a:buFont typeface="+mj-lt"/>
+              <a:buAutoNum type="arabicPeriod"/>
+            </a:pPr>
+            <a:r>
+              <a:rPr lang="en-CA" dirty="0">
+                <a:hlinkClick r:id="rId4"/>
+              </a:rPr>
+              <a:t>https://</a:t>
+            </a:r>
+            <a:r>
+              <a:rPr lang="en-CA" dirty="0" smtClean="0">
+                <a:hlinkClick r:id="rId4"/>
+              </a:rPr>
+              <a:t>github.com/sayar/talks/blob/master/ecse321/tutorial4/reqs_tutorial.md</a:t>
+            </a:r>
+            <a:r>
+              <a:rPr lang="en-CA" dirty="0" smtClean="0"/>
+              <a:t> </a:t>
             </a:r>
           </a:p>
           <a:p>
@@ -6537,1274 +6205,18 @@
     </p:spTree>
     <p:extLst>
       <p:ext uri="{BB962C8B-B14F-4D97-AF65-F5344CB8AC3E}">
-        <p14:creationId xmlns:p14="http://schemas.microsoft.com/office/powerpoint/2010/main" val="601544554"/>
+        <p14:creationId xmlns:p14="http://schemas.microsoft.com/office/powerpoint/2010/main" val="297653093"/>
       </p:ext>
     </p:extLst>
   </p:cSld>
   <p:clrMapOvr>
     <a:masterClrMapping/>
   </p:clrMapOvr>
-  <mc:AlternateContent xmlns:mc="http://schemas.openxmlformats.org/markup-compatibility/2006">
-    <mc:Choice xmlns:p14="http://schemas.microsoft.com/office/powerpoint/2010/main" Requires="p14">
+  <mc:AlternateContent xmlns:mc="http://schemas.openxmlformats.org/markup-compatibility/2006" xmlns:p14="http://schemas.microsoft.com/office/powerpoint/2010/main">
+    <mc:Choice Requires="p14">
       <p:transition p14:dur="0"/>
     </mc:Choice>
-    <mc:Fallback>
-      <p:transition/>
-    </mc:Fallback>
-  </mc:AlternateContent>
-  <p:timing>
-    <p:tnLst>
-      <p:par>
-        <p:cTn id="1" dur="indefinite" restart="never" nodeType="tmRoot"/>
-      </p:par>
-    </p:tnLst>
-  </p:timing>
-</p:sld>
-</file>
-
-<file path=ppt/slides/slide22.xml><?xml version="1.0" encoding="utf-8"?>
-<p:sld xmlns:a="http://schemas.openxmlformats.org/drawingml/2006/main" xmlns:r="http://schemas.openxmlformats.org/officeDocument/2006/relationships" xmlns:p="http://schemas.openxmlformats.org/presentationml/2006/main">
-  <p:cSld>
-    <p:spTree>
-      <p:nvGrpSpPr>
-        <p:cNvPr id="1" name=""/>
-        <p:cNvGrpSpPr/>
-        <p:nvPr/>
-      </p:nvGrpSpPr>
-      <p:grpSpPr>
-        <a:xfrm>
-          <a:off x="0" y="0"/>
-          <a:ext cx="0" cy="0"/>
-          <a:chOff x="0" y="0"/>
-          <a:chExt cx="0" cy="0"/>
-        </a:xfrm>
-      </p:grpSpPr>
-      <p:sp>
-        <p:nvSpPr>
-          <p:cNvPr id="2" name="Title 1"/>
-          <p:cNvSpPr>
-            <a:spLocks noGrp="1"/>
-          </p:cNvSpPr>
-          <p:nvPr>
-            <p:ph type="title"/>
-          </p:nvPr>
-        </p:nvSpPr>
-        <p:spPr/>
-        <p:txBody>
-          <a:bodyPr/>
-          <a:lstStyle/>
-          <a:p>
-            <a:r>
-              <a:rPr lang="en-CA" dirty="0" smtClean="0"/>
-              <a:t>Writing Good Specs</a:t>
-            </a:r>
-            <a:endParaRPr lang="en-CA" dirty="0"/>
-          </a:p>
-        </p:txBody>
-      </p:sp>
-      <p:sp>
-        <p:nvSpPr>
-          <p:cNvPr id="3" name="Content Placeholder 2"/>
-          <p:cNvSpPr>
-            <a:spLocks noGrp="1"/>
-          </p:cNvSpPr>
-          <p:nvPr>
-            <p:ph idx="1"/>
-          </p:nvPr>
-        </p:nvSpPr>
-        <p:spPr/>
-        <p:txBody>
-          <a:bodyPr>
-            <a:normAutofit/>
-          </a:bodyPr>
-          <a:lstStyle/>
-          <a:p>
-            <a:r>
-              <a:rPr lang="en-CA" dirty="0" smtClean="0"/>
-              <a:t>Good spec qualities</a:t>
-            </a:r>
-          </a:p>
-          <a:p>
-            <a:r>
-              <a:rPr lang="en-CA" dirty="0" smtClean="0"/>
-              <a:t>Case studies</a:t>
-            </a:r>
-            <a:endParaRPr lang="en-CA" dirty="0"/>
-          </a:p>
-        </p:txBody>
-      </p:sp>
-      <p:sp>
-        <p:nvSpPr>
-          <p:cNvPr id="4" name="Text Placeholder 3"/>
-          <p:cNvSpPr>
-            <a:spLocks noGrp="1"/>
-          </p:cNvSpPr>
-          <p:nvPr>
-            <p:ph type="body" sz="half" idx="2"/>
-          </p:nvPr>
-        </p:nvSpPr>
-        <p:spPr/>
-        <p:txBody>
-          <a:bodyPr/>
-          <a:lstStyle/>
-          <a:p>
-            <a:r>
-              <a:rPr lang="en-CA" dirty="0" smtClean="0"/>
-              <a:t>Best Practices</a:t>
-            </a:r>
-            <a:endParaRPr lang="en-CA" dirty="0"/>
-          </a:p>
-        </p:txBody>
-      </p:sp>
-    </p:spTree>
-    <p:extLst>
-      <p:ext uri="{BB962C8B-B14F-4D97-AF65-F5344CB8AC3E}">
-        <p14:creationId xmlns:p14="http://schemas.microsoft.com/office/powerpoint/2010/main" val="244446303"/>
-      </p:ext>
-    </p:extLst>
-  </p:cSld>
-  <p:clrMapOvr>
-    <a:masterClrMapping/>
-  </p:clrMapOvr>
-  <mc:AlternateContent xmlns:mc="http://schemas.openxmlformats.org/markup-compatibility/2006">
-    <mc:Choice xmlns:p14="http://schemas.microsoft.com/office/powerpoint/2010/main" Requires="p14">
-      <p:transition p14:dur="0"/>
-    </mc:Choice>
-    <mc:Fallback>
-      <p:transition/>
-    </mc:Fallback>
-  </mc:AlternateContent>
-  <p:timing>
-    <p:tnLst>
-      <p:par>
-        <p:cTn id="1" dur="indefinite" restart="never" nodeType="tmRoot"/>
-      </p:par>
-    </p:tnLst>
-  </p:timing>
-</p:sld>
-</file>
-
-<file path=ppt/slides/slide23.xml><?xml version="1.0" encoding="utf-8"?>
-<p:sld xmlns:a="http://schemas.openxmlformats.org/drawingml/2006/main" xmlns:r="http://schemas.openxmlformats.org/officeDocument/2006/relationships" xmlns:p="http://schemas.openxmlformats.org/presentationml/2006/main">
-  <p:cSld>
-    <p:spTree>
-      <p:nvGrpSpPr>
-        <p:cNvPr id="1" name=""/>
-        <p:cNvGrpSpPr/>
-        <p:nvPr/>
-      </p:nvGrpSpPr>
-      <p:grpSpPr>
-        <a:xfrm>
-          <a:off x="0" y="0"/>
-          <a:ext cx="0" cy="0"/>
-          <a:chOff x="0" y="0"/>
-          <a:chExt cx="0" cy="0"/>
-        </a:xfrm>
-      </p:grpSpPr>
-      <p:sp>
-        <p:nvSpPr>
-          <p:cNvPr id="2" name="Title 1"/>
-          <p:cNvSpPr>
-            <a:spLocks noGrp="1"/>
-          </p:cNvSpPr>
-          <p:nvPr>
-            <p:ph type="title"/>
-          </p:nvPr>
-        </p:nvSpPr>
-        <p:spPr/>
-        <p:txBody>
-          <a:bodyPr/>
-          <a:lstStyle/>
-          <a:p>
-            <a:r>
-              <a:rPr lang="en-CA" dirty="0" smtClean="0"/>
-              <a:t>Qualities of a good spec</a:t>
-            </a:r>
-            <a:endParaRPr lang="en-CA" dirty="0"/>
-          </a:p>
-        </p:txBody>
-      </p:sp>
-      <p:sp>
-        <p:nvSpPr>
-          <p:cNvPr id="4" name="Content Placeholder 2"/>
-          <p:cNvSpPr>
-            <a:spLocks noGrp="1"/>
-          </p:cNvSpPr>
-          <p:nvPr>
-            <p:ph idx="1"/>
-          </p:nvPr>
-        </p:nvSpPr>
-        <p:spPr>
-          <a:xfrm>
-            <a:off x="676274" y="2157731"/>
-            <a:ext cx="10753725" cy="3766185"/>
-          </a:xfrm>
-        </p:spPr>
-        <p:txBody>
-          <a:bodyPr>
-            <a:normAutofit lnSpcReduction="10000"/>
-          </a:bodyPr>
-          <a:lstStyle/>
-          <a:p>
-            <a:r>
-              <a:rPr lang="en-CA" b="1" dirty="0" smtClean="0"/>
-              <a:t>Consistent</a:t>
-            </a:r>
-            <a:r>
-              <a:rPr lang="en-CA" dirty="0" smtClean="0"/>
-              <a:t>: No conflicting requirements</a:t>
-            </a:r>
-          </a:p>
-          <a:p>
-            <a:r>
-              <a:rPr lang="en-CA" b="1" dirty="0" smtClean="0"/>
-              <a:t>Unambiguous</a:t>
-            </a:r>
-            <a:r>
-              <a:rPr lang="en-CA" dirty="0" smtClean="0"/>
-              <a:t>: avoid multiple interpretation</a:t>
-            </a:r>
-          </a:p>
-          <a:p>
-            <a:r>
-              <a:rPr lang="en-CA" b="1" dirty="0" smtClean="0"/>
-              <a:t>Complete</a:t>
-            </a:r>
-            <a:r>
-              <a:rPr lang="en-CA" dirty="0" smtClean="0"/>
-              <a:t>: All behaviour and state is specified</a:t>
-            </a:r>
-          </a:p>
-          <a:p>
-            <a:r>
-              <a:rPr lang="en-CA" b="1" dirty="0" smtClean="0"/>
-              <a:t>Feasible</a:t>
-            </a:r>
-            <a:r>
-              <a:rPr lang="en-CA" dirty="0" smtClean="0"/>
-              <a:t>: It is possible to build a solution that meets the customer’s needs</a:t>
-            </a:r>
-          </a:p>
-          <a:p>
-            <a:r>
-              <a:rPr lang="en-CA" b="1" dirty="0" smtClean="0"/>
-              <a:t>Relevant</a:t>
-            </a:r>
-            <a:r>
-              <a:rPr lang="en-CA" dirty="0" smtClean="0"/>
-              <a:t>: All features are directly related to customer’s need</a:t>
-            </a:r>
-          </a:p>
-          <a:p>
-            <a:r>
-              <a:rPr lang="en-CA" b="1" dirty="0" smtClean="0"/>
-              <a:t>Testable</a:t>
-            </a:r>
-            <a:r>
-              <a:rPr lang="en-CA" dirty="0" smtClean="0"/>
-              <a:t>: Requirement should suggest a test that could demonstrate requirement is met</a:t>
-            </a:r>
-          </a:p>
-          <a:p>
-            <a:r>
-              <a:rPr lang="en-CA" b="1" dirty="0" smtClean="0"/>
-              <a:t>Traceable</a:t>
-            </a:r>
-            <a:r>
-              <a:rPr lang="en-CA" dirty="0" smtClean="0"/>
-              <a:t>: Organized an uniquely labeled</a:t>
-            </a:r>
-          </a:p>
-          <a:p>
-            <a:r>
-              <a:rPr lang="en-CA" b="1" dirty="0" smtClean="0"/>
-              <a:t>Design Free</a:t>
-            </a:r>
-            <a:r>
-              <a:rPr lang="en-CA" dirty="0" smtClean="0"/>
-              <a:t>: No implementation details</a:t>
-            </a:r>
-            <a:endParaRPr lang="en-CA" dirty="0"/>
-          </a:p>
-        </p:txBody>
-      </p:sp>
-    </p:spTree>
-    <p:extLst>
-      <p:ext uri="{BB962C8B-B14F-4D97-AF65-F5344CB8AC3E}">
-        <p14:creationId xmlns:p14="http://schemas.microsoft.com/office/powerpoint/2010/main" val="2536603457"/>
-      </p:ext>
-    </p:extLst>
-  </p:cSld>
-  <p:clrMapOvr>
-    <a:masterClrMapping/>
-  </p:clrMapOvr>
-  <mc:AlternateContent xmlns:mc="http://schemas.openxmlformats.org/markup-compatibility/2006">
-    <mc:Choice xmlns:p14="http://schemas.microsoft.com/office/powerpoint/2010/main" Requires="p14">
-      <p:transition p14:dur="0"/>
-    </mc:Choice>
-    <mc:Fallback>
-      <p:transition/>
-    </mc:Fallback>
-  </mc:AlternateContent>
-  <p:timing>
-    <p:tnLst>
-      <p:par>
-        <p:cTn id="1" dur="indefinite" restart="never" nodeType="tmRoot"/>
-      </p:par>
-    </p:tnLst>
-  </p:timing>
-</p:sld>
-</file>
-
-<file path=ppt/slides/slide24.xml><?xml version="1.0" encoding="utf-8"?>
-<p:sld xmlns:a="http://schemas.openxmlformats.org/drawingml/2006/main" xmlns:r="http://schemas.openxmlformats.org/officeDocument/2006/relationships" xmlns:p="http://schemas.openxmlformats.org/presentationml/2006/main">
-  <p:cSld>
-    <p:spTree>
-      <p:nvGrpSpPr>
-        <p:cNvPr id="1" name=""/>
-        <p:cNvGrpSpPr/>
-        <p:nvPr/>
-      </p:nvGrpSpPr>
-      <p:grpSpPr>
-        <a:xfrm>
-          <a:off x="0" y="0"/>
-          <a:ext cx="0" cy="0"/>
-          <a:chOff x="0" y="0"/>
-          <a:chExt cx="0" cy="0"/>
-        </a:xfrm>
-      </p:grpSpPr>
-      <p:sp>
-        <p:nvSpPr>
-          <p:cNvPr id="2" name="Title 1"/>
-          <p:cNvSpPr>
-            <a:spLocks noGrp="1"/>
-          </p:cNvSpPr>
-          <p:nvPr>
-            <p:ph type="title"/>
-          </p:nvPr>
-        </p:nvSpPr>
-        <p:spPr/>
-        <p:txBody>
-          <a:bodyPr/>
-          <a:lstStyle/>
-          <a:p>
-            <a:r>
-              <a:rPr lang="en-CA" dirty="0" smtClean="0"/>
-              <a:t>Example 1</a:t>
-            </a:r>
-            <a:endParaRPr lang="en-CA" dirty="0"/>
-          </a:p>
-        </p:txBody>
-      </p:sp>
-      <p:sp>
-        <p:nvSpPr>
-          <p:cNvPr id="3" name="Content Placeholder 2"/>
-          <p:cNvSpPr>
-            <a:spLocks noGrp="1"/>
-          </p:cNvSpPr>
-          <p:nvPr>
-            <p:ph idx="1"/>
-          </p:nvPr>
-        </p:nvSpPr>
-        <p:spPr>
-          <a:xfrm>
-            <a:off x="676274" y="2157731"/>
-            <a:ext cx="10753725" cy="3766185"/>
-          </a:xfrm>
-        </p:spPr>
-        <p:txBody>
-          <a:bodyPr/>
-          <a:lstStyle/>
-          <a:p>
-            <a:pPr marL="0" indent="0">
-              <a:buNone/>
-            </a:pPr>
-            <a:r>
-              <a:rPr lang="en-CA" dirty="0" smtClean="0"/>
-              <a:t>2.1 Login Screen</a:t>
-            </a:r>
-          </a:p>
-          <a:p>
-            <a:pPr marL="0" indent="0">
-              <a:buNone/>
-            </a:pPr>
-            <a:r>
-              <a:rPr lang="en-CA" dirty="0" smtClean="0"/>
-              <a:t>2.1.2 The login screen shall have an input field for username and password and a button for submitting the information. </a:t>
-            </a:r>
-          </a:p>
-          <a:p>
-            <a:pPr marL="0" indent="0">
-              <a:buNone/>
-            </a:pPr>
-            <a:r>
-              <a:rPr lang="en-CA" dirty="0" smtClean="0"/>
-              <a:t>2.1.3 The password shall also be obfuscated such that an onlooker will not able to read the typed message. </a:t>
-            </a:r>
-          </a:p>
-          <a:p>
-            <a:pPr marL="0" indent="0">
-              <a:buNone/>
-            </a:pPr>
-            <a:r>
-              <a:rPr lang="en-CA" dirty="0" smtClean="0"/>
-              <a:t>2.1.3 The login screen will lock the app after detecting any significant attempts to hack into the app.</a:t>
-            </a:r>
-          </a:p>
-          <a:p>
-            <a:pPr marL="0" indent="0">
-              <a:buNone/>
-            </a:pPr>
-            <a:endParaRPr lang="en-CA" dirty="0" smtClean="0"/>
-          </a:p>
-          <a:p>
-            <a:pPr marL="0" indent="0">
-              <a:buNone/>
-            </a:pPr>
-            <a:endParaRPr lang="en-CA" dirty="0"/>
-          </a:p>
-          <a:p>
-            <a:pPr marL="0" indent="0">
-              <a:buNone/>
-            </a:pPr>
-            <a:endParaRPr lang="en-CA" dirty="0"/>
-          </a:p>
-        </p:txBody>
-      </p:sp>
-    </p:spTree>
-    <p:extLst>
-      <p:ext uri="{BB962C8B-B14F-4D97-AF65-F5344CB8AC3E}">
-        <p14:creationId xmlns:p14="http://schemas.microsoft.com/office/powerpoint/2010/main" val="3527470307"/>
-      </p:ext>
-    </p:extLst>
-  </p:cSld>
-  <p:clrMapOvr>
-    <a:masterClrMapping/>
-  </p:clrMapOvr>
-  <mc:AlternateContent xmlns:mc="http://schemas.openxmlformats.org/markup-compatibility/2006">
-    <mc:Choice xmlns:p14="http://schemas.microsoft.com/office/powerpoint/2010/main" Requires="p14">
-      <p:transition p14:dur="0"/>
-    </mc:Choice>
-    <mc:Fallback>
-      <p:transition/>
-    </mc:Fallback>
-  </mc:AlternateContent>
-  <p:timing>
-    <p:tnLst>
-      <p:par>
-        <p:cTn id="1" dur="indefinite" restart="never" nodeType="tmRoot"/>
-      </p:par>
-    </p:tnLst>
-  </p:timing>
-</p:sld>
-</file>
-
-<file path=ppt/slides/slide25.xml><?xml version="1.0" encoding="utf-8"?>
-<p:sld xmlns:a="http://schemas.openxmlformats.org/drawingml/2006/main" xmlns:r="http://schemas.openxmlformats.org/officeDocument/2006/relationships" xmlns:p="http://schemas.openxmlformats.org/presentationml/2006/main">
-  <p:cSld>
-    <p:spTree>
-      <p:nvGrpSpPr>
-        <p:cNvPr id="1" name=""/>
-        <p:cNvGrpSpPr/>
-        <p:nvPr/>
-      </p:nvGrpSpPr>
-      <p:grpSpPr>
-        <a:xfrm>
-          <a:off x="0" y="0"/>
-          <a:ext cx="0" cy="0"/>
-          <a:chOff x="0" y="0"/>
-          <a:chExt cx="0" cy="0"/>
-        </a:xfrm>
-      </p:grpSpPr>
-      <p:sp>
-        <p:nvSpPr>
-          <p:cNvPr id="2" name="Title 1"/>
-          <p:cNvSpPr>
-            <a:spLocks noGrp="1"/>
-          </p:cNvSpPr>
-          <p:nvPr>
-            <p:ph type="title"/>
-          </p:nvPr>
-        </p:nvSpPr>
-        <p:spPr/>
-        <p:txBody>
-          <a:bodyPr/>
-          <a:lstStyle/>
-          <a:p>
-            <a:r>
-              <a:rPr lang="en-CA" dirty="0" smtClean="0"/>
-              <a:t>Example 1</a:t>
-            </a:r>
-            <a:endParaRPr lang="en-CA" dirty="0"/>
-          </a:p>
-        </p:txBody>
-      </p:sp>
-      <p:sp>
-        <p:nvSpPr>
-          <p:cNvPr id="3" name="Content Placeholder 2"/>
-          <p:cNvSpPr>
-            <a:spLocks noGrp="1"/>
-          </p:cNvSpPr>
-          <p:nvPr>
-            <p:ph idx="1"/>
-          </p:nvPr>
-        </p:nvSpPr>
-        <p:spPr>
-          <a:xfrm>
-            <a:off x="676274" y="2157731"/>
-            <a:ext cx="10753725" cy="3766185"/>
-          </a:xfrm>
-        </p:spPr>
-        <p:txBody>
-          <a:bodyPr>
-            <a:normAutofit fontScale="85000" lnSpcReduction="20000"/>
-          </a:bodyPr>
-          <a:lstStyle/>
-          <a:p>
-            <a:pPr marL="0" indent="0">
-              <a:buNone/>
-            </a:pPr>
-            <a:r>
-              <a:rPr lang="en-CA" dirty="0" smtClean="0"/>
-              <a:t>2.1 </a:t>
-            </a:r>
-            <a:r>
-              <a:rPr lang="en-CA" b="1" dirty="0" smtClean="0"/>
-              <a:t>Login Screen</a:t>
-            </a:r>
-          </a:p>
-          <a:p>
-            <a:pPr marL="0" indent="0">
-              <a:buNone/>
-            </a:pPr>
-            <a:r>
-              <a:rPr lang="en-CA" dirty="0" smtClean="0"/>
-              <a:t>2.1.1 </a:t>
-            </a:r>
-            <a:r>
-              <a:rPr lang="en-CA" b="1" dirty="0" smtClean="0">
-                <a:solidFill>
-                  <a:srgbClr val="00B050"/>
-                </a:solidFill>
-              </a:rPr>
-              <a:t>Screen Layout</a:t>
-            </a:r>
-          </a:p>
-          <a:p>
-            <a:pPr marL="0" indent="0">
-              <a:buNone/>
-            </a:pPr>
-            <a:r>
-              <a:rPr lang="en-CA" dirty="0" smtClean="0"/>
-              <a:t>The login screen shall have an input field for username, </a:t>
-            </a:r>
-            <a:r>
-              <a:rPr lang="en-CA" dirty="0" smtClean="0">
-                <a:solidFill>
-                  <a:srgbClr val="00B050"/>
-                </a:solidFill>
-              </a:rPr>
-              <a:t>an input field </a:t>
-            </a:r>
-            <a:r>
-              <a:rPr lang="en-CA" dirty="0" smtClean="0"/>
-              <a:t>for password and a button for submitting the information. </a:t>
-            </a:r>
-          </a:p>
-          <a:p>
-            <a:pPr marL="0" indent="0">
-              <a:buNone/>
-            </a:pPr>
-            <a:r>
-              <a:rPr lang="en-CA" dirty="0" smtClean="0"/>
-              <a:t>2.1.2 </a:t>
-            </a:r>
-            <a:r>
-              <a:rPr lang="en-CA" b="1" dirty="0" smtClean="0">
-                <a:solidFill>
-                  <a:srgbClr val="00B050"/>
-                </a:solidFill>
-              </a:rPr>
-              <a:t>Password Protection</a:t>
-            </a:r>
-          </a:p>
-          <a:p>
-            <a:pPr marL="0" indent="0">
-              <a:buNone/>
-            </a:pPr>
-            <a:r>
-              <a:rPr lang="en-CA" dirty="0" smtClean="0"/>
-              <a:t>The password shall be obfuscated such that an onlooker will not able to read the typed message. </a:t>
-            </a:r>
-          </a:p>
-          <a:p>
-            <a:pPr marL="0" indent="0">
-              <a:buNone/>
-            </a:pPr>
-            <a:r>
-              <a:rPr lang="en-CA" dirty="0" smtClean="0"/>
-              <a:t>2.1.</a:t>
-            </a:r>
-            <a:r>
-              <a:rPr lang="en-CA" dirty="0">
-                <a:solidFill>
-                  <a:srgbClr val="00B050"/>
-                </a:solidFill>
-              </a:rPr>
-              <a:t>3</a:t>
-            </a:r>
-            <a:r>
-              <a:rPr lang="en-CA" dirty="0" smtClean="0"/>
-              <a:t> </a:t>
-            </a:r>
-            <a:r>
-              <a:rPr lang="en-CA" b="1" dirty="0" smtClean="0">
-                <a:solidFill>
-                  <a:srgbClr val="00B050"/>
-                </a:solidFill>
-              </a:rPr>
-              <a:t>Intrusion Detection</a:t>
-            </a:r>
-          </a:p>
-          <a:p>
-            <a:pPr marL="0" indent="0">
-              <a:buNone/>
-            </a:pPr>
-            <a:r>
-              <a:rPr lang="en-CA" dirty="0" smtClean="0"/>
-              <a:t>The login screen will prevent subsequent login attempts for 3 minutes after detecting 3 failed login attempts. This will prevent unauthorized access.</a:t>
-            </a:r>
-          </a:p>
-          <a:p>
-            <a:pPr marL="0" indent="0">
-              <a:buNone/>
-            </a:pPr>
-            <a:r>
-              <a:rPr lang="en-CA" dirty="0" smtClean="0">
-                <a:solidFill>
-                  <a:srgbClr val="00B050"/>
-                </a:solidFill>
-              </a:rPr>
-              <a:t>2.1.4 </a:t>
-            </a:r>
-            <a:r>
-              <a:rPr lang="en-CA" b="1" dirty="0" smtClean="0">
-                <a:solidFill>
-                  <a:srgbClr val="00B050"/>
-                </a:solidFill>
-              </a:rPr>
-              <a:t>Successful Login</a:t>
-            </a:r>
-          </a:p>
-          <a:p>
-            <a:pPr marL="0" indent="0">
-              <a:buNone/>
-            </a:pPr>
-            <a:r>
-              <a:rPr lang="en-CA" dirty="0" smtClean="0">
-                <a:solidFill>
-                  <a:srgbClr val="00B050"/>
-                </a:solidFill>
-              </a:rPr>
-              <a:t>Upon Successful login attempt the user will be presented to conversations Screen</a:t>
-            </a:r>
-          </a:p>
-          <a:p>
-            <a:pPr marL="0" indent="0">
-              <a:buNone/>
-            </a:pPr>
-            <a:endParaRPr lang="en-CA" dirty="0" smtClean="0"/>
-          </a:p>
-          <a:p>
-            <a:pPr marL="0" indent="0">
-              <a:buNone/>
-            </a:pPr>
-            <a:endParaRPr lang="en-CA" dirty="0" smtClean="0"/>
-          </a:p>
-          <a:p>
-            <a:pPr marL="0" indent="0">
-              <a:buNone/>
-            </a:pPr>
-            <a:endParaRPr lang="en-CA" dirty="0"/>
-          </a:p>
-          <a:p>
-            <a:pPr marL="0" indent="0">
-              <a:buNone/>
-            </a:pPr>
-            <a:endParaRPr lang="en-CA" dirty="0"/>
-          </a:p>
-        </p:txBody>
-      </p:sp>
-    </p:spTree>
-    <p:extLst>
-      <p:ext uri="{BB962C8B-B14F-4D97-AF65-F5344CB8AC3E}">
-        <p14:creationId xmlns:p14="http://schemas.microsoft.com/office/powerpoint/2010/main" val="4288549972"/>
-      </p:ext>
-    </p:extLst>
-  </p:cSld>
-  <p:clrMapOvr>
-    <a:masterClrMapping/>
-  </p:clrMapOvr>
-  <mc:AlternateContent xmlns:mc="http://schemas.openxmlformats.org/markup-compatibility/2006">
-    <mc:Choice xmlns:p14="http://schemas.microsoft.com/office/powerpoint/2010/main" Requires="p14">
-      <p:transition p14:dur="0"/>
-    </mc:Choice>
-    <mc:Fallback>
-      <p:transition/>
-    </mc:Fallback>
-  </mc:AlternateContent>
-  <p:timing>
-    <p:tnLst>
-      <p:par>
-        <p:cTn id="1" dur="indefinite" restart="never" nodeType="tmRoot"/>
-      </p:par>
-    </p:tnLst>
-  </p:timing>
-</p:sld>
-</file>
-
-<file path=ppt/slides/slide26.xml><?xml version="1.0" encoding="utf-8"?>
-<p:sld xmlns:a="http://schemas.openxmlformats.org/drawingml/2006/main" xmlns:r="http://schemas.openxmlformats.org/officeDocument/2006/relationships" xmlns:p="http://schemas.openxmlformats.org/presentationml/2006/main">
-  <p:cSld>
-    <p:spTree>
-      <p:nvGrpSpPr>
-        <p:cNvPr id="1" name=""/>
-        <p:cNvGrpSpPr/>
-        <p:nvPr/>
-      </p:nvGrpSpPr>
-      <p:grpSpPr>
-        <a:xfrm>
-          <a:off x="0" y="0"/>
-          <a:ext cx="0" cy="0"/>
-          <a:chOff x="0" y="0"/>
-          <a:chExt cx="0" cy="0"/>
-        </a:xfrm>
-      </p:grpSpPr>
-      <p:sp>
-        <p:nvSpPr>
-          <p:cNvPr id="2" name="Title 1"/>
-          <p:cNvSpPr>
-            <a:spLocks noGrp="1"/>
-          </p:cNvSpPr>
-          <p:nvPr>
-            <p:ph type="title"/>
-          </p:nvPr>
-        </p:nvSpPr>
-        <p:spPr/>
-        <p:txBody>
-          <a:bodyPr/>
-          <a:lstStyle/>
-          <a:p>
-            <a:r>
-              <a:rPr lang="en-CA" dirty="0" smtClean="0"/>
-              <a:t>Example 2</a:t>
-            </a:r>
-            <a:endParaRPr lang="en-CA" dirty="0"/>
-          </a:p>
-        </p:txBody>
-      </p:sp>
-      <p:sp>
-        <p:nvSpPr>
-          <p:cNvPr id="3" name="Content Placeholder 2"/>
-          <p:cNvSpPr>
-            <a:spLocks noGrp="1"/>
-          </p:cNvSpPr>
-          <p:nvPr>
-            <p:ph idx="1"/>
-          </p:nvPr>
-        </p:nvSpPr>
-        <p:spPr/>
-        <p:txBody>
-          <a:bodyPr>
-            <a:normAutofit lnSpcReduction="10000"/>
-          </a:bodyPr>
-          <a:lstStyle/>
-          <a:p>
-            <a:r>
-              <a:rPr lang="en-CA" dirty="0" smtClean="0"/>
-              <a:t>3.1 </a:t>
-            </a:r>
-            <a:r>
-              <a:rPr lang="en-CA" b="1" dirty="0" smtClean="0"/>
-              <a:t>File Transfers</a:t>
-            </a:r>
-          </a:p>
-          <a:p>
-            <a:r>
-              <a:rPr lang="en-CA" dirty="0" smtClean="0"/>
-              <a:t>3.1.1 </a:t>
-            </a:r>
-            <a:r>
-              <a:rPr lang="en-CA" b="1" dirty="0" smtClean="0"/>
-              <a:t>File Types</a:t>
-            </a:r>
-          </a:p>
-          <a:p>
-            <a:r>
-              <a:rPr lang="en-CA" dirty="0" smtClean="0"/>
-              <a:t>Only files with .jpg extension can be sent</a:t>
-            </a:r>
-          </a:p>
-          <a:p>
-            <a:r>
-              <a:rPr lang="en-CA" dirty="0" smtClean="0"/>
-              <a:t>3.1.2 </a:t>
-            </a:r>
-            <a:r>
-              <a:rPr lang="en-CA" b="1" dirty="0" smtClean="0"/>
-              <a:t>File size</a:t>
-            </a:r>
-          </a:p>
-          <a:p>
-            <a:r>
-              <a:rPr lang="en-CA" dirty="0" smtClean="0"/>
-              <a:t>Files cannot Exceed 100kb</a:t>
-            </a:r>
-          </a:p>
-          <a:p>
-            <a:r>
-              <a:rPr lang="en-CA" dirty="0" smtClean="0"/>
-              <a:t>3.1.3 </a:t>
-            </a:r>
-            <a:r>
-              <a:rPr lang="en-CA" b="1" dirty="0" smtClean="0"/>
-              <a:t>Analytics &amp; Reporting</a:t>
-            </a:r>
-          </a:p>
-          <a:p>
-            <a:r>
-              <a:rPr lang="en-CA" dirty="0" smtClean="0"/>
-              <a:t>Collect File transfer rate in nano seconds as a Key Performance indicator using Google Analytics library</a:t>
-            </a:r>
-          </a:p>
-          <a:p>
-            <a:r>
-              <a:rPr lang="en-CA" dirty="0" smtClean="0"/>
-              <a:t>3.1.4 …..</a:t>
-            </a:r>
-          </a:p>
-          <a:p>
-            <a:endParaRPr lang="en-CA" dirty="0"/>
-          </a:p>
-        </p:txBody>
-      </p:sp>
-    </p:spTree>
-    <p:extLst>
-      <p:ext uri="{BB962C8B-B14F-4D97-AF65-F5344CB8AC3E}">
-        <p14:creationId xmlns:p14="http://schemas.microsoft.com/office/powerpoint/2010/main" val="2101398176"/>
-      </p:ext>
-    </p:extLst>
-  </p:cSld>
-  <p:clrMapOvr>
-    <a:masterClrMapping/>
-  </p:clrMapOvr>
-  <mc:AlternateContent xmlns:mc="http://schemas.openxmlformats.org/markup-compatibility/2006">
-    <mc:Choice xmlns:p14="http://schemas.microsoft.com/office/powerpoint/2010/main" Requires="p14">
-      <p:transition p14:dur="0"/>
-    </mc:Choice>
-    <mc:Fallback>
-      <p:transition/>
-    </mc:Fallback>
-  </mc:AlternateContent>
-  <p:timing>
-    <p:tnLst>
-      <p:par>
-        <p:cTn id="1" dur="indefinite" restart="never" nodeType="tmRoot"/>
-      </p:par>
-    </p:tnLst>
-  </p:timing>
-</p:sld>
-</file>
-
-<file path=ppt/slides/slide27.xml><?xml version="1.0" encoding="utf-8"?>
-<p:sld xmlns:a="http://schemas.openxmlformats.org/drawingml/2006/main" xmlns:r="http://schemas.openxmlformats.org/officeDocument/2006/relationships" xmlns:p="http://schemas.openxmlformats.org/presentationml/2006/main">
-  <p:cSld>
-    <p:spTree>
-      <p:nvGrpSpPr>
-        <p:cNvPr id="1" name=""/>
-        <p:cNvGrpSpPr/>
-        <p:nvPr/>
-      </p:nvGrpSpPr>
-      <p:grpSpPr>
-        <a:xfrm>
-          <a:off x="0" y="0"/>
-          <a:ext cx="0" cy="0"/>
-          <a:chOff x="0" y="0"/>
-          <a:chExt cx="0" cy="0"/>
-        </a:xfrm>
-      </p:grpSpPr>
-      <p:sp>
-        <p:nvSpPr>
-          <p:cNvPr id="2" name="Title 1"/>
-          <p:cNvSpPr>
-            <a:spLocks noGrp="1"/>
-          </p:cNvSpPr>
-          <p:nvPr>
-            <p:ph type="title"/>
-          </p:nvPr>
-        </p:nvSpPr>
-        <p:spPr/>
-        <p:txBody>
-          <a:bodyPr/>
-          <a:lstStyle/>
-          <a:p>
-            <a:r>
-              <a:rPr lang="en-CA" dirty="0" smtClean="0"/>
-              <a:t>Example 2</a:t>
-            </a:r>
-            <a:endParaRPr lang="en-CA" dirty="0"/>
-          </a:p>
-        </p:txBody>
-      </p:sp>
-      <p:sp>
-        <p:nvSpPr>
-          <p:cNvPr id="3" name="Content Placeholder 2"/>
-          <p:cNvSpPr>
-            <a:spLocks noGrp="1"/>
-          </p:cNvSpPr>
-          <p:nvPr>
-            <p:ph idx="1"/>
-          </p:nvPr>
-        </p:nvSpPr>
-        <p:spPr/>
-        <p:txBody>
-          <a:bodyPr>
-            <a:normAutofit/>
-          </a:bodyPr>
-          <a:lstStyle/>
-          <a:p>
-            <a:r>
-              <a:rPr lang="en-CA" dirty="0" smtClean="0"/>
-              <a:t>3.1 </a:t>
-            </a:r>
-            <a:r>
-              <a:rPr lang="en-CA" b="1" dirty="0" smtClean="0"/>
-              <a:t>File Transfers</a:t>
-            </a:r>
-          </a:p>
-          <a:p>
-            <a:r>
-              <a:rPr lang="en-CA" dirty="0" smtClean="0"/>
-              <a:t>3.1.1 </a:t>
-            </a:r>
-            <a:r>
-              <a:rPr lang="en-CA" b="1" dirty="0" smtClean="0"/>
-              <a:t>File Types</a:t>
-            </a:r>
-          </a:p>
-          <a:p>
-            <a:r>
-              <a:rPr lang="en-CA" dirty="0" smtClean="0"/>
-              <a:t>Only files with .jpg extension can be sent</a:t>
-            </a:r>
-          </a:p>
-          <a:p>
-            <a:r>
-              <a:rPr lang="en-CA" dirty="0" smtClean="0"/>
-              <a:t>3.1.2 </a:t>
-            </a:r>
-            <a:r>
-              <a:rPr lang="en-CA" b="1" dirty="0" smtClean="0"/>
-              <a:t>File size</a:t>
-            </a:r>
-          </a:p>
-          <a:p>
-            <a:r>
-              <a:rPr lang="en-CA" dirty="0" smtClean="0"/>
-              <a:t>Files cannot</a:t>
-            </a:r>
-            <a:r>
-              <a:rPr lang="en-CA" dirty="0" smtClean="0">
-                <a:solidFill>
-                  <a:srgbClr val="00B050"/>
-                </a:solidFill>
-              </a:rPr>
-              <a:t> Exceed 5Mb</a:t>
-            </a:r>
-          </a:p>
-          <a:p>
-            <a:r>
-              <a:rPr lang="en-CA" dirty="0" smtClean="0"/>
-              <a:t>3.1.3 </a:t>
-            </a:r>
-            <a:r>
-              <a:rPr lang="en-CA" b="1" dirty="0" smtClean="0"/>
-              <a:t>Analytics &amp; Reporting</a:t>
-            </a:r>
-          </a:p>
-          <a:p>
-            <a:r>
-              <a:rPr lang="en-CA" dirty="0" smtClean="0"/>
-              <a:t>Collect File transfer rates in milliseconds as a Key Performance indicator </a:t>
-            </a:r>
-          </a:p>
-          <a:p>
-            <a:r>
-              <a:rPr lang="en-CA" dirty="0" smtClean="0"/>
-              <a:t>3.1.4 …..</a:t>
-            </a:r>
-          </a:p>
-          <a:p>
-            <a:endParaRPr lang="en-CA" dirty="0"/>
-          </a:p>
-        </p:txBody>
-      </p:sp>
-    </p:spTree>
-    <p:extLst>
-      <p:ext uri="{BB962C8B-B14F-4D97-AF65-F5344CB8AC3E}">
-        <p14:creationId xmlns:p14="http://schemas.microsoft.com/office/powerpoint/2010/main" val="3134510899"/>
-      </p:ext>
-    </p:extLst>
-  </p:cSld>
-  <p:clrMapOvr>
-    <a:masterClrMapping/>
-  </p:clrMapOvr>
-  <mc:AlternateContent xmlns:mc="http://schemas.openxmlformats.org/markup-compatibility/2006">
-    <mc:Choice xmlns:p14="http://schemas.microsoft.com/office/powerpoint/2010/main" Requires="p14">
-      <p:transition p14:dur="0"/>
-    </mc:Choice>
-    <mc:Fallback>
-      <p:transition/>
-    </mc:Fallback>
-  </mc:AlternateContent>
-  <p:timing>
-    <p:tnLst>
-      <p:par>
-        <p:cTn id="1" dur="indefinite" restart="never" nodeType="tmRoot"/>
-      </p:par>
-    </p:tnLst>
-  </p:timing>
-</p:sld>
-</file>
-
-<file path=ppt/slides/slide28.xml><?xml version="1.0" encoding="utf-8"?>
-<p:sld xmlns:a="http://schemas.openxmlformats.org/drawingml/2006/main" xmlns:r="http://schemas.openxmlformats.org/officeDocument/2006/relationships" xmlns:p="http://schemas.openxmlformats.org/presentationml/2006/main">
-  <p:cSld>
-    <p:spTree>
-      <p:nvGrpSpPr>
-        <p:cNvPr id="1" name=""/>
-        <p:cNvGrpSpPr/>
-        <p:nvPr/>
-      </p:nvGrpSpPr>
-      <p:grpSpPr>
-        <a:xfrm>
-          <a:off x="0" y="0"/>
-          <a:ext cx="0" cy="0"/>
-          <a:chOff x="0" y="0"/>
-          <a:chExt cx="0" cy="0"/>
-        </a:xfrm>
-      </p:grpSpPr>
-      <p:sp>
-        <p:nvSpPr>
-          <p:cNvPr id="2" name="Title 1"/>
-          <p:cNvSpPr>
-            <a:spLocks noGrp="1"/>
-          </p:cNvSpPr>
-          <p:nvPr>
-            <p:ph type="title"/>
-          </p:nvPr>
-        </p:nvSpPr>
-        <p:spPr/>
-        <p:txBody>
-          <a:bodyPr/>
-          <a:lstStyle/>
-          <a:p>
-            <a:r>
-              <a:rPr lang="en-CA" dirty="0" smtClean="0"/>
-              <a:t>Example 3</a:t>
-            </a:r>
-            <a:endParaRPr lang="en-CA" dirty="0"/>
-          </a:p>
-        </p:txBody>
-      </p:sp>
-      <p:sp>
-        <p:nvSpPr>
-          <p:cNvPr id="3" name="Content Placeholder 2"/>
-          <p:cNvSpPr>
-            <a:spLocks noGrp="1"/>
-          </p:cNvSpPr>
-          <p:nvPr>
-            <p:ph idx="1"/>
-          </p:nvPr>
-        </p:nvSpPr>
-        <p:spPr>
-          <a:xfrm>
-            <a:off x="676274" y="2104139"/>
-            <a:ext cx="10753725" cy="3766185"/>
-          </a:xfrm>
-        </p:spPr>
-        <p:txBody>
-          <a:bodyPr/>
-          <a:lstStyle/>
-          <a:p>
-            <a:r>
-              <a:rPr lang="en-CA" dirty="0"/>
-              <a:t>Expert Video: </a:t>
-            </a:r>
-            <a:r>
-              <a:rPr lang="en-CA" dirty="0">
-                <a:hlinkClick r:id="rId2"/>
-              </a:rPr>
-              <a:t>https://www.youtube.com/watch?v=BKorP55Aqvg</a:t>
-            </a:r>
-            <a:r>
-              <a:rPr lang="en-CA" dirty="0"/>
-              <a:t> </a:t>
-            </a:r>
-          </a:p>
-          <a:p>
-            <a:endParaRPr lang="en-CA" dirty="0"/>
-          </a:p>
-        </p:txBody>
-      </p:sp>
-    </p:spTree>
-    <p:extLst>
-      <p:ext uri="{BB962C8B-B14F-4D97-AF65-F5344CB8AC3E}">
-        <p14:creationId xmlns:p14="http://schemas.microsoft.com/office/powerpoint/2010/main" val="2097510329"/>
-      </p:ext>
-    </p:extLst>
-  </p:cSld>
-  <p:clrMapOvr>
-    <a:masterClrMapping/>
-  </p:clrMapOvr>
-  <mc:AlternateContent xmlns:mc="http://schemas.openxmlformats.org/markup-compatibility/2006">
-    <mc:Choice xmlns:p14="http://schemas.microsoft.com/office/powerpoint/2010/main" Requires="p14">
-      <p:transition p14:dur="0"/>
-    </mc:Choice>
-    <mc:Fallback>
-      <p:transition/>
-    </mc:Fallback>
-  </mc:AlternateContent>
-  <p:timing>
-    <p:tnLst>
-      <p:par>
-        <p:cTn id="1" dur="indefinite" restart="never" nodeType="tmRoot"/>
-      </p:par>
-    </p:tnLst>
-  </p:timing>
-</p:sld>
-</file>
-
-<file path=ppt/slides/slide29.xml><?xml version="1.0" encoding="utf-8"?>
-<p:sld xmlns:a="http://schemas.openxmlformats.org/drawingml/2006/main" xmlns:r="http://schemas.openxmlformats.org/officeDocument/2006/relationships" xmlns:p="http://schemas.openxmlformats.org/presentationml/2006/main">
-  <p:cSld>
-    <p:spTree>
-      <p:nvGrpSpPr>
-        <p:cNvPr id="1" name=""/>
-        <p:cNvGrpSpPr/>
-        <p:nvPr/>
-      </p:nvGrpSpPr>
-      <p:grpSpPr>
-        <a:xfrm>
-          <a:off x="0" y="0"/>
-          <a:ext cx="0" cy="0"/>
-          <a:chOff x="0" y="0"/>
-          <a:chExt cx="0" cy="0"/>
-        </a:xfrm>
-      </p:grpSpPr>
-      <p:sp>
-        <p:nvSpPr>
-          <p:cNvPr id="2" name="Title 1"/>
-          <p:cNvSpPr>
-            <a:spLocks noGrp="1"/>
-          </p:cNvSpPr>
-          <p:nvPr>
-            <p:ph type="title"/>
-          </p:nvPr>
-        </p:nvSpPr>
-        <p:spPr/>
-        <p:txBody>
-          <a:bodyPr/>
-          <a:lstStyle/>
-          <a:p>
-            <a:r>
-              <a:rPr lang="en-CA" dirty="0" smtClean="0"/>
-              <a:t>Extra Credit</a:t>
-            </a:r>
-            <a:endParaRPr lang="en-CA" dirty="0"/>
-          </a:p>
-        </p:txBody>
-      </p:sp>
-      <p:sp>
-        <p:nvSpPr>
-          <p:cNvPr id="3" name="Content Placeholder 2"/>
-          <p:cNvSpPr>
-            <a:spLocks noGrp="1"/>
-          </p:cNvSpPr>
-          <p:nvPr>
-            <p:ph idx="1"/>
-          </p:nvPr>
-        </p:nvSpPr>
-        <p:spPr/>
-        <p:txBody>
-          <a:bodyPr/>
-          <a:lstStyle/>
-          <a:p>
-            <a:r>
-              <a:rPr lang="en-CA" dirty="0" smtClean="0"/>
-              <a:t>Expert Video</a:t>
-            </a:r>
-            <a:r>
-              <a:rPr lang="en-CA" dirty="0"/>
-              <a:t>: </a:t>
-            </a:r>
-            <a:r>
-              <a:rPr lang="en-CA" dirty="0">
-                <a:hlinkClick r:id="rId2"/>
-              </a:rPr>
-              <a:t>https://</a:t>
-            </a:r>
-            <a:r>
-              <a:rPr lang="en-CA" dirty="0" smtClean="0">
-                <a:hlinkClick r:id="rId2"/>
-              </a:rPr>
-              <a:t>www.youtube.com/watch?v=BKorP55Aqvg</a:t>
-            </a:r>
-            <a:r>
-              <a:rPr lang="en-CA" dirty="0" smtClean="0"/>
-              <a:t> </a:t>
-            </a:r>
-          </a:p>
-          <a:p>
-            <a:r>
-              <a:rPr lang="en-CA" dirty="0"/>
-              <a:t>Ruby Spec: </a:t>
-            </a:r>
-            <a:r>
-              <a:rPr lang="en-CA" dirty="0">
-                <a:hlinkClick r:id="rId3"/>
-              </a:rPr>
-              <a:t>http://</a:t>
-            </a:r>
-            <a:r>
-              <a:rPr lang="en-CA" dirty="0" smtClean="0">
-                <a:hlinkClick r:id="rId3"/>
-              </a:rPr>
-              <a:t>vk.com/video1678620_163231929</a:t>
-            </a:r>
-            <a:r>
-              <a:rPr lang="en-CA" dirty="0" smtClean="0"/>
-              <a:t> </a:t>
-            </a:r>
-            <a:endParaRPr lang="en-CA" dirty="0"/>
-          </a:p>
-        </p:txBody>
-      </p:sp>
-    </p:spTree>
-    <p:extLst>
-      <p:ext uri="{BB962C8B-B14F-4D97-AF65-F5344CB8AC3E}">
-        <p14:creationId xmlns:p14="http://schemas.microsoft.com/office/powerpoint/2010/main" val="3758018437"/>
-      </p:ext>
-    </p:extLst>
-  </p:cSld>
-  <p:clrMapOvr>
-    <a:masterClrMapping/>
-  </p:clrMapOvr>
-  <mc:AlternateContent xmlns:mc="http://schemas.openxmlformats.org/markup-compatibility/2006">
-    <mc:Choice xmlns:p14="http://schemas.microsoft.com/office/powerpoint/2010/main" Requires="p14">
-      <p:transition p14:dur="0"/>
-    </mc:Choice>
-    <mc:Fallback>
+    <mc:Fallback xmlns="">
       <p:transition/>
     </mc:Fallback>
   </mc:AlternateContent>
@@ -8014,158 +6426,11 @@
   <p:clrMapOvr>
     <a:masterClrMapping/>
   </p:clrMapOvr>
-  <mc:AlternateContent xmlns:mc="http://schemas.openxmlformats.org/markup-compatibility/2006">
-    <mc:Choice xmlns:p14="http://schemas.microsoft.com/office/powerpoint/2010/main" Requires="p14">
+  <mc:AlternateContent xmlns:mc="http://schemas.openxmlformats.org/markup-compatibility/2006" xmlns:p14="http://schemas.microsoft.com/office/powerpoint/2010/main">
+    <mc:Choice Requires="p14">
       <p:transition p14:dur="0"/>
     </mc:Choice>
-    <mc:Fallback>
-      <p:transition/>
-    </mc:Fallback>
-  </mc:AlternateContent>
-  <p:timing>
-    <p:tnLst>
-      <p:par>
-        <p:cTn id="1" dur="indefinite" restart="never" nodeType="tmRoot"/>
-      </p:par>
-    </p:tnLst>
-  </p:timing>
-</p:sld>
-</file>
-
-<file path=ppt/slides/slide30.xml><?xml version="1.0" encoding="utf-8"?>
-<p:sld xmlns:a="http://schemas.openxmlformats.org/drawingml/2006/main" xmlns:r="http://schemas.openxmlformats.org/officeDocument/2006/relationships" xmlns:p="http://schemas.openxmlformats.org/presentationml/2006/main">
-  <p:cSld>
-    <p:spTree>
-      <p:nvGrpSpPr>
-        <p:cNvPr id="1" name=""/>
-        <p:cNvGrpSpPr/>
-        <p:nvPr/>
-      </p:nvGrpSpPr>
-      <p:grpSpPr>
-        <a:xfrm>
-          <a:off x="0" y="0"/>
-          <a:ext cx="0" cy="0"/>
-          <a:chOff x="0" y="0"/>
-          <a:chExt cx="0" cy="0"/>
-        </a:xfrm>
-      </p:grpSpPr>
-      <p:sp>
-        <p:nvSpPr>
-          <p:cNvPr id="2" name="Title 1"/>
-          <p:cNvSpPr>
-            <a:spLocks noGrp="1"/>
-          </p:cNvSpPr>
-          <p:nvPr>
-            <p:ph type="title"/>
-          </p:nvPr>
-        </p:nvSpPr>
-        <p:spPr/>
-        <p:txBody>
-          <a:bodyPr/>
-          <a:lstStyle/>
-          <a:p>
-            <a:r>
-              <a:rPr lang="en-CA" dirty="0" smtClean="0"/>
-              <a:t>References</a:t>
-            </a:r>
-            <a:endParaRPr lang="en-CA" dirty="0"/>
-          </a:p>
-        </p:txBody>
-      </p:sp>
-      <p:sp>
-        <p:nvSpPr>
-          <p:cNvPr id="3" name="Content Placeholder 2"/>
-          <p:cNvSpPr>
-            <a:spLocks noGrp="1"/>
-          </p:cNvSpPr>
-          <p:nvPr>
-            <p:ph idx="1"/>
-          </p:nvPr>
-        </p:nvSpPr>
-        <p:spPr/>
-        <p:txBody>
-          <a:bodyPr/>
-          <a:lstStyle/>
-          <a:p>
-            <a:pPr marL="457200" indent="-457200">
-              <a:buFont typeface="+mj-lt"/>
-              <a:buAutoNum type="arabicPeriod"/>
-            </a:pPr>
-            <a:r>
-              <a:rPr lang="en-CA" dirty="0">
-                <a:hlinkClick r:id="rId2"/>
-              </a:rPr>
-              <a:t>https://</a:t>
-            </a:r>
-            <a:r>
-              <a:rPr lang="en-CA" dirty="0" smtClean="0">
-                <a:hlinkClick r:id="rId2"/>
-              </a:rPr>
-              <a:t>www.ibm.com/developerworks/community/blogs/requirementsmanagement/entry/good-requirements-writing?lang=en</a:t>
-            </a:r>
-            <a:endParaRPr lang="en-CA" dirty="0" smtClean="0"/>
-          </a:p>
-          <a:p>
-            <a:pPr marL="457200" indent="-457200">
-              <a:buFont typeface="+mj-lt"/>
-              <a:buAutoNum type="arabicPeriod"/>
-            </a:pPr>
-            <a:r>
-              <a:rPr lang="en-CA" dirty="0">
-                <a:hlinkClick r:id="rId3"/>
-              </a:rPr>
-              <a:t>http://</a:t>
-            </a:r>
-            <a:r>
-              <a:rPr lang="en-CA" dirty="0" smtClean="0">
-                <a:hlinkClick r:id="rId3"/>
-              </a:rPr>
-              <a:t>www.incose.org/chicagoland/docs/Writing%20Effective%20Requirements.pdf</a:t>
-            </a:r>
-            <a:endParaRPr lang="en-CA" dirty="0" smtClean="0"/>
-          </a:p>
-          <a:p>
-            <a:pPr marL="457200" indent="-457200">
-              <a:buFont typeface="+mj-lt"/>
-              <a:buAutoNum type="arabicPeriod"/>
-            </a:pPr>
-            <a:r>
-              <a:rPr lang="en-CA" dirty="0">
-                <a:hlinkClick r:id="rId4"/>
-              </a:rPr>
-              <a:t>https://</a:t>
-            </a:r>
-            <a:r>
-              <a:rPr lang="en-CA" dirty="0" smtClean="0">
-                <a:hlinkClick r:id="rId4"/>
-              </a:rPr>
-              <a:t>github.com/sayar/talks/blob/master/ecse321/tutorial4/reqs_tutorial.md</a:t>
-            </a:r>
-            <a:r>
-              <a:rPr lang="en-CA" dirty="0" smtClean="0"/>
-              <a:t> </a:t>
-            </a:r>
-          </a:p>
-          <a:p>
-            <a:endParaRPr lang="en-CA" dirty="0"/>
-          </a:p>
-        </p:txBody>
-      </p:sp>
-    </p:spTree>
-    <p:extLst>
-      <p:ext uri="{BB962C8B-B14F-4D97-AF65-F5344CB8AC3E}">
-        <p14:creationId xmlns:p14="http://schemas.microsoft.com/office/powerpoint/2010/main" val="297653093"/>
-      </p:ext>
-    </p:extLst>
-  </p:cSld>
-  <p:clrMapOvr>
-    <a:masterClrMapping/>
-  </p:clrMapOvr>
-  <mc:AlternateContent xmlns:mc="http://schemas.openxmlformats.org/markup-compatibility/2006">
-    <mc:Choice xmlns:p14="http://schemas.microsoft.com/office/powerpoint/2010/main" Requires="p14">
-      <p:transition p14:dur="0"/>
-    </mc:Choice>
-    <mc:Fallback>
+    <mc:Fallback xmlns="">
       <p:transition/>
     </mc:Fallback>
   </mc:AlternateContent>
@@ -8296,11 +6561,11 @@
   <p:clrMapOvr>
     <a:masterClrMapping/>
   </p:clrMapOvr>
-  <mc:AlternateContent xmlns:mc="http://schemas.openxmlformats.org/markup-compatibility/2006">
-    <mc:Choice xmlns:p14="http://schemas.microsoft.com/office/powerpoint/2010/main" Requires="p14">
+  <mc:AlternateContent xmlns:mc="http://schemas.openxmlformats.org/markup-compatibility/2006" xmlns:p14="http://schemas.microsoft.com/office/powerpoint/2010/main">
+    <mc:Choice Requires="p14">
       <p:transition p14:dur="0"/>
     </mc:Choice>
-    <mc:Fallback>
+    <mc:Fallback xmlns="">
       <p:transition/>
     </mc:Fallback>
   </mc:AlternateContent>
@@ -8423,11 +6688,11 @@
   <p:clrMapOvr>
     <a:masterClrMapping/>
   </p:clrMapOvr>
-  <mc:AlternateContent xmlns:mc="http://schemas.openxmlformats.org/markup-compatibility/2006">
-    <mc:Choice xmlns:p14="http://schemas.microsoft.com/office/powerpoint/2010/main" Requires="p14">
+  <mc:AlternateContent xmlns:mc="http://schemas.openxmlformats.org/markup-compatibility/2006" xmlns:p14="http://schemas.microsoft.com/office/powerpoint/2010/main">
+    <mc:Choice Requires="p14">
       <p:transition p14:dur="0"/>
     </mc:Choice>
-    <mc:Fallback>
+    <mc:Fallback xmlns="">
       <p:transition/>
     </mc:Fallback>
   </mc:AlternateContent>
@@ -8604,11 +6869,11 @@
   <p:clrMapOvr>
     <a:masterClrMapping/>
   </p:clrMapOvr>
-  <mc:AlternateContent xmlns:mc="http://schemas.openxmlformats.org/markup-compatibility/2006">
-    <mc:Choice xmlns:p14="http://schemas.microsoft.com/office/powerpoint/2010/main" Requires="p14">
+  <mc:AlternateContent xmlns:mc="http://schemas.openxmlformats.org/markup-compatibility/2006" xmlns:p14="http://schemas.microsoft.com/office/powerpoint/2010/main">
+    <mc:Choice Requires="p14">
       <p:transition p14:dur="0"/>
     </mc:Choice>
-    <mc:Fallback>
+    <mc:Fallback xmlns="">
       <p:transition/>
     </mc:Fallback>
   </mc:AlternateContent>
@@ -8723,11 +6988,11 @@
   <p:clrMapOvr>
     <a:masterClrMapping/>
   </p:clrMapOvr>
-  <mc:AlternateContent xmlns:mc="http://schemas.openxmlformats.org/markup-compatibility/2006">
-    <mc:Choice xmlns:p14="http://schemas.microsoft.com/office/powerpoint/2010/main" Requires="p14">
+  <mc:AlternateContent xmlns:mc="http://schemas.openxmlformats.org/markup-compatibility/2006" xmlns:p14="http://schemas.microsoft.com/office/powerpoint/2010/main">
+    <mc:Choice Requires="p14">
       <p:transition p14:dur="0"/>
     </mc:Choice>
-    <mc:Fallback>
+    <mc:Fallback xmlns="">
       <p:transition/>
     </mc:Fallback>
   </mc:AlternateContent>
@@ -8775,7 +7040,7 @@
           <a:p>
             <a:r>
               <a:rPr lang="en-CA" dirty="0" smtClean="0"/>
-              <a:t>Functional Requirements</a:t>
+              <a:t>Non Functional Requirements	</a:t>
             </a:r>
             <a:endParaRPr lang="en-CA" dirty="0"/>
           </a:p>
@@ -8798,69 +7063,128 @@
           <a:p>
             <a:r>
               <a:rPr lang="en-CA" dirty="0" smtClean="0"/>
-              <a:t>Describes behaviour or state based on: inputs, outputs, error state, Initial state.</a:t>
-            </a:r>
-          </a:p>
-          <a:p>
-            <a:r>
-              <a:rPr lang="en-CA" dirty="0" smtClean="0"/>
-              <a:t>Functional requirements are features</a:t>
-            </a:r>
-          </a:p>
-          <a:p>
+              <a:t>Describe some </a:t>
+            </a:r>
+            <a:r>
+              <a:rPr lang="en-CA" b="1" dirty="0" smtClean="0"/>
+              <a:t>quality</a:t>
+            </a:r>
+            <a:r>
+              <a:rPr lang="en-CA" dirty="0" smtClean="0"/>
+              <a:t> of the software</a:t>
+            </a:r>
+          </a:p>
+          <a:p>
+            <a:endParaRPr lang="en-CA" dirty="0" smtClean="0"/>
+          </a:p>
+          <a:p>
+            <a:r>
+              <a:rPr lang="en-CA" dirty="0"/>
+              <a:t>Functional requirements are </a:t>
+            </a:r>
+            <a:r>
+              <a:rPr lang="en-CA" dirty="0" smtClean="0"/>
+              <a:t>features</a:t>
+            </a:r>
+          </a:p>
+          <a:p>
+            <a:r>
+              <a:rPr lang="en-CA" dirty="0" smtClean="0"/>
+              <a:t>Quality </a:t>
+            </a:r>
+            <a:r>
+              <a:rPr lang="en-CA" dirty="0"/>
+              <a:t>requirements are usually more quantifiable (e.g., </a:t>
+            </a:r>
+            <a:r>
+              <a:rPr lang="en-CA" dirty="0" smtClean="0"/>
+              <a:t>response time)</a:t>
+            </a:r>
+          </a:p>
+          <a:p>
+            <a:pPr marL="0" indent="0">
+              <a:buNone/>
+            </a:pPr>
             <a:endParaRPr lang="en-CA" dirty="0"/>
           </a:p>
           <a:p>
             <a:r>
-              <a:rPr lang="en-CA" u="sng" dirty="0" smtClean="0"/>
-              <a:t>Examples</a:t>
-            </a:r>
-          </a:p>
-          <a:p>
-            <a:r>
-              <a:rPr lang="en-CA" dirty="0" smtClean="0"/>
-              <a:t>When the app is </a:t>
-            </a:r>
-            <a:r>
-              <a:rPr lang="en-CA" b="1" dirty="0" smtClean="0"/>
-              <a:t>first opened</a:t>
-            </a:r>
-            <a:r>
-              <a:rPr lang="en-CA" dirty="0" smtClean="0"/>
-              <a:t>, the user shall be prompted with a login Screen.</a:t>
-            </a:r>
-          </a:p>
-          <a:p>
-            <a:r>
-              <a:rPr lang="en-CA" dirty="0" smtClean="0"/>
-              <a:t>Within a conversation, the user can </a:t>
-            </a:r>
-            <a:r>
-              <a:rPr lang="en-CA" b="1" dirty="0" smtClean="0"/>
-              <a:t>scroll up </a:t>
-            </a:r>
-            <a:r>
-              <a:rPr lang="en-CA" dirty="0" smtClean="0"/>
-              <a:t>to see their conversation history.</a:t>
-            </a:r>
+              <a:rPr lang="en-CA" dirty="0"/>
+              <a:t>Also includes</a:t>
+            </a:r>
+          </a:p>
+          <a:p>
+            <a:r>
+              <a:rPr lang="en-CA" dirty="0" smtClean="0"/>
+              <a:t>Design </a:t>
+            </a:r>
+            <a:r>
+              <a:rPr lang="en-CA" dirty="0"/>
+              <a:t>constraints (e.g., platform or required interface)</a:t>
+            </a:r>
+          </a:p>
+          <a:p>
+            <a:r>
+              <a:rPr lang="en-CA" dirty="0" smtClean="0"/>
+              <a:t>Process </a:t>
+            </a:r>
+            <a:r>
+              <a:rPr lang="en-CA" dirty="0"/>
+              <a:t>constraints (e.g., required documentation or process</a:t>
+            </a:r>
+            <a:r>
+              <a:rPr lang="en-CA" dirty="0" smtClean="0"/>
+              <a:t>)</a:t>
+            </a:r>
+            <a:endParaRPr lang="en-CA" dirty="0"/>
+          </a:p>
+        </p:txBody>
+      </p:sp>
+      <p:sp>
+        <p:nvSpPr>
+          <p:cNvPr id="4" name="TextBox 3"/>
+          <p:cNvSpPr txBox="1"/>
+          <p:nvPr/>
+        </p:nvSpPr>
+        <p:spPr>
+          <a:xfrm>
+            <a:off x="676656" y="6055743"/>
+            <a:ext cx="4878771" cy="369332"/>
+          </a:xfrm>
+          <a:prstGeom prst="rect">
+            <a:avLst/>
+          </a:prstGeom>
+          <a:noFill/>
+        </p:spPr>
+        <p:txBody>
+          <a:bodyPr wrap="none" rtlCol="0">
+            <a:spAutoFit/>
+          </a:bodyPr>
+          <a:lstStyle/>
+          <a:p>
+            <a:r>
+              <a:rPr lang="en-CA" dirty="0" smtClean="0"/>
+              <a:t>The following are all Non-Functional Requirements</a:t>
+            </a:r>
+            <a:endParaRPr lang="en-CA" dirty="0"/>
           </a:p>
         </p:txBody>
       </p:sp>
     </p:spTree>
     <p:extLst>
       <p:ext uri="{BB962C8B-B14F-4D97-AF65-F5344CB8AC3E}">
-        <p14:creationId xmlns:p14="http://schemas.microsoft.com/office/powerpoint/2010/main" val="330413581"/>
+        <p14:creationId xmlns:p14="http://schemas.microsoft.com/office/powerpoint/2010/main" val="1574775276"/>
       </p:ext>
     </p:extLst>
   </p:cSld>
   <p:clrMapOvr>
     <a:masterClrMapping/>
   </p:clrMapOvr>
-  <mc:AlternateContent xmlns:mc="http://schemas.openxmlformats.org/markup-compatibility/2006">
-    <mc:Choice xmlns:p14="http://schemas.microsoft.com/office/powerpoint/2010/main" Requires="p14">
+  <mc:AlternateContent xmlns:mc="http://schemas.openxmlformats.org/markup-compatibility/2006" xmlns:p14="http://schemas.microsoft.com/office/powerpoint/2010/main">
+    <mc:Choice Requires="p14">
       <p:transition p14:dur="0"/>
     </mc:Choice>
-    <mc:Fallback>
+    <mc:Fallback xmlns="">
       <p:transition/>
     </mc:Fallback>
   </mc:AlternateContent>
@@ -8908,7 +7232,7 @@
           <a:p>
             <a:r>
               <a:rPr lang="en-CA" dirty="0" smtClean="0"/>
-              <a:t>Non Functional Requirements	</a:t>
+              <a:t>Performance Requirements</a:t>
             </a:r>
             <a:endParaRPr lang="en-CA" dirty="0"/>
           </a:p>
@@ -8930,129 +7254,54 @@
           <a:lstStyle/>
           <a:p>
             <a:r>
-              <a:rPr lang="en-CA" dirty="0" smtClean="0"/>
-              <a:t>Describe some </a:t>
-            </a:r>
-            <a:r>
-              <a:rPr lang="en-CA" b="1" dirty="0" smtClean="0"/>
-              <a:t>quality</a:t>
-            </a:r>
-            <a:r>
-              <a:rPr lang="en-CA" dirty="0" smtClean="0"/>
-              <a:t> of the software</a:t>
-            </a:r>
-          </a:p>
-          <a:p>
+              <a:rPr lang="en-CA" dirty="0"/>
+              <a:t>Execution speed, response time, or throughput?</a:t>
+            </a:r>
+          </a:p>
+          <a:p>
+            <a:r>
+              <a:rPr lang="en-CA" dirty="0" smtClean="0"/>
+              <a:t>How </a:t>
+            </a:r>
+            <a:r>
+              <a:rPr lang="en-CA" dirty="0"/>
+              <a:t>much data will flow through the system?</a:t>
+            </a:r>
+          </a:p>
+          <a:p>
+            <a:r>
+              <a:rPr lang="en-CA" dirty="0" smtClean="0"/>
+              <a:t>How </a:t>
+            </a:r>
+            <a:r>
+              <a:rPr lang="en-CA" dirty="0"/>
+              <a:t>often is data sent or received?</a:t>
+            </a:r>
             <a:endParaRPr lang="en-CA" dirty="0" smtClean="0"/>
           </a:p>
           <a:p>
             <a:r>
-              <a:rPr lang="en-CA" dirty="0"/>
-              <a:t>Functional requirements are </a:t>
-            </a:r>
-            <a:r>
-              <a:rPr lang="en-CA" dirty="0" smtClean="0"/>
-              <a:t>features</a:t>
-            </a:r>
-          </a:p>
-          <a:p>
-            <a:r>
-              <a:rPr lang="en-CA" dirty="0" smtClean="0"/>
-              <a:t>Quality </a:t>
-            </a:r>
-            <a:r>
-              <a:rPr lang="en-CA" dirty="0"/>
-              <a:t>requirements are usually more quantifiable (e.g., </a:t>
-            </a:r>
-            <a:r>
-              <a:rPr lang="en-CA" dirty="0" smtClean="0"/>
-              <a:t>response time)</a:t>
-            </a:r>
-          </a:p>
-          <a:p>
-            <a:pPr marL="0" indent="0">
-              <a:buNone/>
-            </a:pPr>
-            <a:endParaRPr lang="en-CA" dirty="0"/>
-          </a:p>
-          <a:p>
-            <a:r>
-              <a:rPr lang="en-CA" dirty="0"/>
-              <a:t>Also includes</a:t>
-            </a:r>
-          </a:p>
-          <a:p>
-            <a:r>
-              <a:rPr lang="en-CA" dirty="0" smtClean="0"/>
-              <a:t>Design </a:t>
-            </a:r>
-            <a:r>
-              <a:rPr lang="en-CA" dirty="0"/>
-              <a:t>constraints (e.g., platform or required interface)</a:t>
-            </a:r>
-          </a:p>
-          <a:p>
-            <a:r>
-              <a:rPr lang="en-CA" dirty="0" smtClean="0"/>
-              <a:t>Process </a:t>
-            </a:r>
-            <a:r>
-              <a:rPr lang="en-CA" dirty="0"/>
-              <a:t>constraints (e.g., required documentation or process</a:t>
-            </a:r>
-            <a:r>
-              <a:rPr lang="en-CA" dirty="0" smtClean="0"/>
-              <a:t>)</a:t>
-            </a:r>
-            <a:endParaRPr lang="en-CA" dirty="0"/>
-          </a:p>
-        </p:txBody>
-      </p:sp>
-      <p:sp>
-        <p:nvSpPr>
-          <p:cNvPr id="4" name="TextBox 3"/>
-          <p:cNvSpPr txBox="1"/>
-          <p:nvPr/>
-        </p:nvSpPr>
-        <p:spPr>
-          <a:xfrm>
-            <a:off x="676656" y="6055743"/>
-            <a:ext cx="4878771" cy="369332"/>
-          </a:xfrm>
-          <a:prstGeom prst="rect">
-            <a:avLst/>
-          </a:prstGeom>
-          <a:noFill/>
-        </p:spPr>
-        <p:txBody>
-          <a:bodyPr wrap="none" rtlCol="0">
-            <a:spAutoFit/>
-          </a:bodyPr>
-          <a:lstStyle/>
-          <a:p>
-            <a:r>
-              <a:rPr lang="en-CA" dirty="0" smtClean="0"/>
-              <a:t>The following are all Non-Functional Requirements</a:t>
-            </a:r>
-            <a:endParaRPr lang="en-CA" dirty="0"/>
+              <a:rPr lang="en-CA" dirty="0" smtClean="0"/>
+              <a:t>What are the limits of the system?</a:t>
+            </a:r>
           </a:p>
         </p:txBody>
       </p:sp>
     </p:spTree>
     <p:extLst>
       <p:ext uri="{BB962C8B-B14F-4D97-AF65-F5344CB8AC3E}">
-        <p14:creationId xmlns:p14="http://schemas.microsoft.com/office/powerpoint/2010/main" val="1574775276"/>
+        <p14:creationId xmlns:p14="http://schemas.microsoft.com/office/powerpoint/2010/main" val="141419607"/>
       </p:ext>
     </p:extLst>
   </p:cSld>
   <p:clrMapOvr>
     <a:masterClrMapping/>
   </p:clrMapOvr>
-  <mc:AlternateContent xmlns:mc="http://schemas.openxmlformats.org/markup-compatibility/2006">
-    <mc:Choice xmlns:p14="http://schemas.microsoft.com/office/powerpoint/2010/main" Requires="p14">
+  <mc:AlternateContent xmlns:mc="http://schemas.openxmlformats.org/markup-compatibility/2006" xmlns:p14="http://schemas.microsoft.com/office/powerpoint/2010/main">
+    <mc:Choice Requires="p14">
       <p:transition p14:dur="0"/>
     </mc:Choice>
-    <mc:Fallback>
+    <mc:Fallback xmlns="">
       <p:transition/>
     </mc:Fallback>
   </mc:AlternateContent>
@@ -9565,18 +7814,18 @@
 </file>
 
 <file path=customXml/item1.xml><?xml version="1.0" encoding="utf-8"?>
-<p:properties xmlns:p="http://schemas.microsoft.com/office/2006/metadata/properties" xmlns:xsi="http://www.w3.org/2001/XMLSchema-instance" xmlns:pc="http://schemas.microsoft.com/office/infopath/2007/PartnerControls">
-  <documentManagement/>
-</p:properties>
-</file>
-
-<file path=customXml/item2.xml><?xml version="1.0" encoding="utf-8"?>
 <?mso-contentType ?>
 <FormTemplates xmlns="http://schemas.microsoft.com/sharepoint/v3/contenttype/forms">
   <Display>DocumentLibraryForm</Display>
   <Edit>DocumentLibraryForm</Edit>
   <New>DocumentLibraryForm</New>
 </FormTemplates>
+</file>
+
+<file path=customXml/item2.xml><?xml version="1.0" encoding="utf-8"?>
+<p:properties xmlns:p="http://schemas.microsoft.com/office/2006/metadata/properties" xmlns:xsi="http://www.w3.org/2001/XMLSchema-instance" xmlns:pc="http://schemas.microsoft.com/office/infopath/2007/PartnerControls">
+  <documentManagement/>
+</p:properties>
 </file>
 
 <file path=customXml/item3.xml><?xml version="1.0" encoding="utf-8"?>
@@ -9694,6 +7943,14 @@
 </file>
 
 <file path=customXml/itemProps1.xml><?xml version="1.0" encoding="utf-8"?>
+<ds:datastoreItem xmlns:ds="http://schemas.openxmlformats.org/officeDocument/2006/customXml" ds:itemID="{76B64549-C1F2-49EA-8B2D-5EF61BF1CE56}">
+  <ds:schemaRefs>
+    <ds:schemaRef ds:uri="http://schemas.microsoft.com/sharepoint/v3/contenttype/forms"/>
+  </ds:schemaRefs>
+</ds:datastoreItem>
+</file>
+
+<file path=customXml/itemProps2.xml><?xml version="1.0" encoding="utf-8"?>
 <ds:datastoreItem xmlns:ds="http://schemas.openxmlformats.org/officeDocument/2006/customXml" ds:itemID="{FF71E0A8-DA6F-4DC5-84AA-9AE90625C277}">
   <ds:schemaRefs>
     <ds:schemaRef ds:uri="http://schemas.microsoft.com/office/2006/metadata/properties"/>
@@ -9704,14 +7961,6 @@
     <ds:schemaRef ds:uri="http://schemas.microsoft.com/office/2006/documentManagement/types"/>
     <ds:schemaRef ds:uri="http://schemas.microsoft.com/office/infopath/2007/PartnerControls"/>
     <ds:schemaRef ds:uri="http://www.w3.org/XML/1998/namespace"/>
-  </ds:schemaRefs>
-</ds:datastoreItem>
-</file>
-
-<file path=customXml/itemProps2.xml><?xml version="1.0" encoding="utf-8"?>
-<ds:datastoreItem xmlns:ds="http://schemas.openxmlformats.org/officeDocument/2006/customXml" ds:itemID="{76B64549-C1F2-49EA-8B2D-5EF61BF1CE56}">
-  <ds:schemaRefs>
-    <ds:schemaRef ds:uri="http://schemas.microsoft.com/sharepoint/v3/contenttype/forms"/>
   </ds:schemaRefs>
 </ds:datastoreItem>
 </file>

</xml_diff>